<commit_message>
* LTG l10 bullet point fixes
</commit_message>
<xml_diff>
--- a/The-Limits-to-Growth/LTG-L10-Beyond-the-Circular-Economy--Part-1.pptx
+++ b/The-Limits-to-Growth/LTG-L10-Beyond-the-Circular-Economy--Part-1.pptx
@@ -1873,7 +1873,7 @@
         <p:spPr>
           <a:xfrm>
             <a:off x="11444760" y="0"/>
-            <a:ext cx="721800" cy="6830640"/>
+            <a:ext cx="721440" cy="6830280"/>
           </a:xfrm>
           <a:prstGeom prst="rect">
             <a:avLst/>
@@ -1922,7 +1922,7 @@
         <p:spPr>
           <a:xfrm>
             <a:off x="11438640" y="6453360"/>
-            <a:ext cx="738720" cy="363960"/>
+            <a:ext cx="738360" cy="363960"/>
           </a:xfrm>
           <a:prstGeom prst="rect">
             <a:avLst/>
@@ -1948,7 +1948,7 @@
                 <a:spcPct val="100000"/>
               </a:lnSpc>
             </a:pPr>
-            <a:fld id="{E7A67090-2402-4740-A72F-95E75FF9F94E}" type="slidenum">
+            <a:fld id="{5383FB08-23C2-4F36-90C5-1F857250A71C}" type="slidenum">
               <a:rPr b="0" lang="en-US" sz="1800" spc="-1" strike="noStrike">
                 <a:solidFill>
                   <a:srgbClr val="808080"/>
@@ -1976,7 +1976,7 @@
         <p:spPr>
           <a:xfrm>
             <a:off x="912240" y="1268280"/>
-            <a:ext cx="9188640" cy="342000"/>
+            <a:ext cx="9188280" cy="341640"/>
           </a:xfrm>
           <a:prstGeom prst="rect">
             <a:avLst/>
@@ -2025,7 +2025,7 @@
         <p:spPr>
           <a:xfrm>
             <a:off x="0" y="0"/>
-            <a:ext cx="3032640" cy="542520"/>
+            <a:ext cx="3032280" cy="542160"/>
           </a:xfrm>
           <a:prstGeom prst="rect">
             <a:avLst/>
@@ -2048,7 +2048,7 @@
         <p:spPr>
           <a:xfrm>
             <a:off x="7430400" y="134640"/>
-            <a:ext cx="3678480" cy="494640"/>
+            <a:ext cx="3678120" cy="494280"/>
           </a:xfrm>
           <a:prstGeom prst="rect">
             <a:avLst/>
@@ -2067,7 +2067,7 @@
         <p:spPr>
           <a:xfrm>
             <a:off x="912240" y="1268280"/>
-            <a:ext cx="9188640" cy="342000"/>
+            <a:ext cx="9188280" cy="341640"/>
           </a:xfrm>
           <a:prstGeom prst="rect">
             <a:avLst/>
@@ -2112,7 +2112,7 @@
         <p:spPr>
           <a:xfrm>
             <a:off x="11444760" y="0"/>
-            <a:ext cx="721800" cy="6830640"/>
+            <a:ext cx="721440" cy="6830280"/>
           </a:xfrm>
           <a:prstGeom prst="rect">
             <a:avLst/>
@@ -2161,7 +2161,7 @@
         <p:spPr>
           <a:xfrm>
             <a:off x="0" y="6642720"/>
-            <a:ext cx="12164760" cy="211320"/>
+            <a:ext cx="12164400" cy="211320"/>
           </a:xfrm>
           <a:prstGeom prst="rect">
             <a:avLst/>
@@ -2526,7 +2526,7 @@
         <p:spPr>
           <a:xfrm>
             <a:off x="527400" y="1412640"/>
-            <a:ext cx="10341720" cy="1128240"/>
+            <a:ext cx="10341360" cy="1127880"/>
           </a:xfrm>
           <a:prstGeom prst="rect">
             <a:avLst/>
@@ -2580,7 +2580,7 @@
         <p:spPr>
           <a:xfrm>
             <a:off x="527400" y="2852640"/>
-            <a:ext cx="10341720" cy="2349000"/>
+            <a:ext cx="10341360" cy="2348640"/>
           </a:xfrm>
           <a:prstGeom prst="rect">
             <a:avLst/>
@@ -2776,7 +2776,7 @@
         <p:spPr>
           <a:xfrm>
             <a:off x="335520" y="764640"/>
-            <a:ext cx="10728720" cy="479520"/>
+            <a:ext cx="10728360" cy="479160"/>
           </a:xfrm>
           <a:prstGeom prst="rect">
             <a:avLst/>
@@ -2830,7 +2830,7 @@
         <p:spPr>
           <a:xfrm>
             <a:off x="335520" y="1268280"/>
-            <a:ext cx="10728720" cy="5016240"/>
+            <a:ext cx="10728360" cy="5015880"/>
           </a:xfrm>
           <a:prstGeom prst="rect">
             <a:avLst/>
@@ -2952,7 +2952,7 @@
         <p:spPr>
           <a:xfrm>
             <a:off x="432720" y="1148040"/>
-            <a:ext cx="10334160" cy="474840"/>
+            <a:ext cx="10333800" cy="474480"/>
           </a:xfrm>
           <a:prstGeom prst="rect">
             <a:avLst/>
@@ -3006,7 +3006,7 @@
         <p:spPr>
           <a:xfrm>
             <a:off x="263520" y="6411600"/>
-            <a:ext cx="11073960" cy="226800"/>
+            <a:ext cx="11073600" cy="226800"/>
           </a:xfrm>
           <a:prstGeom prst="rect">
             <a:avLst/>
@@ -3060,7 +3060,7 @@
         <p:spPr>
           <a:xfrm>
             <a:off x="282240" y="2340000"/>
-            <a:ext cx="10782000" cy="1178640"/>
+            <a:ext cx="10781640" cy="1178280"/>
           </a:xfrm>
           <a:prstGeom prst="roundRect">
             <a:avLst>
@@ -3116,7 +3116,7 @@
         <p:spPr>
           <a:xfrm>
             <a:off x="539280" y="2215080"/>
-            <a:ext cx="10333800" cy="875520"/>
+            <a:ext cx="10333440" cy="875160"/>
           </a:xfrm>
           <a:prstGeom prst="rect">
             <a:avLst/>
@@ -3234,7 +3234,7 @@
         <p:spPr>
           <a:xfrm>
             <a:off x="335520" y="764640"/>
-            <a:ext cx="10728720" cy="479520"/>
+            <a:ext cx="10728360" cy="479160"/>
           </a:xfrm>
           <a:prstGeom prst="rect">
             <a:avLst/>
@@ -3288,7 +3288,7 @@
         <p:spPr>
           <a:xfrm>
             <a:off x="335520" y="1268280"/>
-            <a:ext cx="10728720" cy="5016240"/>
+            <a:ext cx="10728360" cy="5015880"/>
           </a:xfrm>
           <a:prstGeom prst="rect">
             <a:avLst/>
@@ -3400,7 +3400,7 @@
         <p:spPr>
           <a:xfrm>
             <a:off x="432720" y="1148040"/>
-            <a:ext cx="10334160" cy="474840"/>
+            <a:ext cx="10333800" cy="474480"/>
           </a:xfrm>
           <a:prstGeom prst="rect">
             <a:avLst/>
@@ -3454,7 +3454,7 @@
         <p:spPr>
           <a:xfrm>
             <a:off x="263520" y="6411600"/>
-            <a:ext cx="11073960" cy="226800"/>
+            <a:ext cx="11073600" cy="226800"/>
           </a:xfrm>
           <a:prstGeom prst="rect">
             <a:avLst/>
@@ -3508,7 +3508,7 @@
         <p:spPr>
           <a:xfrm>
             <a:off x="282240" y="2340000"/>
-            <a:ext cx="10782000" cy="1178640"/>
+            <a:ext cx="10781640" cy="1178280"/>
           </a:xfrm>
           <a:prstGeom prst="roundRect">
             <a:avLst>
@@ -3564,7 +3564,7 @@
         <p:spPr>
           <a:xfrm>
             <a:off x="539280" y="2215080"/>
-            <a:ext cx="10333800" cy="875520"/>
+            <a:ext cx="10333440" cy="875160"/>
           </a:xfrm>
           <a:prstGeom prst="rect">
             <a:avLst/>
@@ -3682,7 +3682,7 @@
         <p:spPr>
           <a:xfrm>
             <a:off x="335520" y="764640"/>
-            <a:ext cx="10728720" cy="479520"/>
+            <a:ext cx="10728360" cy="479160"/>
           </a:xfrm>
           <a:prstGeom prst="rect">
             <a:avLst/>
@@ -3736,7 +3736,7 @@
         <p:spPr>
           <a:xfrm>
             <a:off x="335520" y="1268280"/>
-            <a:ext cx="10728720" cy="5016240"/>
+            <a:ext cx="10728360" cy="5015880"/>
           </a:xfrm>
           <a:prstGeom prst="rect">
             <a:avLst/>
@@ -3832,7 +3832,7 @@
         <p:spPr>
           <a:xfrm>
             <a:off x="432720" y="1148040"/>
-            <a:ext cx="10334160" cy="474840"/>
+            <a:ext cx="10333800" cy="474480"/>
           </a:xfrm>
           <a:prstGeom prst="rect">
             <a:avLst/>
@@ -3886,7 +3886,7 @@
         <p:spPr>
           <a:xfrm>
             <a:off x="263520" y="6411600"/>
-            <a:ext cx="11073960" cy="226800"/>
+            <a:ext cx="11073600" cy="226800"/>
           </a:xfrm>
           <a:prstGeom prst="rect">
             <a:avLst/>
@@ -3940,7 +3940,7 @@
         <p:spPr>
           <a:xfrm>
             <a:off x="282240" y="2160000"/>
-            <a:ext cx="10782000" cy="1358640"/>
+            <a:ext cx="10781640" cy="1358280"/>
           </a:xfrm>
           <a:prstGeom prst="roundRect">
             <a:avLst>
@@ -3996,7 +3996,7 @@
         <p:spPr>
           <a:xfrm>
             <a:off x="540000" y="1980000"/>
-            <a:ext cx="10333800" cy="1110600"/>
+            <a:ext cx="10333440" cy="1110240"/>
           </a:xfrm>
           <a:prstGeom prst="rect">
             <a:avLst/>
@@ -4114,7 +4114,7 @@
         <p:spPr>
           <a:xfrm>
             <a:off x="335520" y="764640"/>
-            <a:ext cx="10728720" cy="479520"/>
+            <a:ext cx="10728360" cy="479160"/>
           </a:xfrm>
           <a:prstGeom prst="rect">
             <a:avLst/>
@@ -4168,7 +4168,7 @@
         <p:spPr>
           <a:xfrm>
             <a:off x="335520" y="1268280"/>
-            <a:ext cx="10728720" cy="5016240"/>
+            <a:ext cx="10728360" cy="5015880"/>
           </a:xfrm>
           <a:prstGeom prst="rect">
             <a:avLst/>
@@ -4290,7 +4290,7 @@
         <p:spPr>
           <a:xfrm>
             <a:off x="432720" y="1148040"/>
-            <a:ext cx="10334160" cy="474840"/>
+            <a:ext cx="10333800" cy="474480"/>
           </a:xfrm>
           <a:prstGeom prst="rect">
             <a:avLst/>
@@ -4344,7 +4344,7 @@
         <p:spPr>
           <a:xfrm>
             <a:off x="263520" y="6411600"/>
-            <a:ext cx="11073960" cy="226800"/>
+            <a:ext cx="11073600" cy="226800"/>
           </a:xfrm>
           <a:prstGeom prst="rect">
             <a:avLst/>
@@ -4398,7 +4398,7 @@
         <p:spPr>
           <a:xfrm>
             <a:off x="282240" y="2160000"/>
-            <a:ext cx="10782000" cy="1358640"/>
+            <a:ext cx="10781640" cy="1358280"/>
           </a:xfrm>
           <a:prstGeom prst="roundRect">
             <a:avLst>
@@ -4454,7 +4454,7 @@
         <p:spPr>
           <a:xfrm>
             <a:off x="540000" y="1980000"/>
-            <a:ext cx="10333800" cy="1110600"/>
+            <a:ext cx="10333440" cy="1110240"/>
           </a:xfrm>
           <a:prstGeom prst="rect">
             <a:avLst/>
@@ -4572,7 +4572,7 @@
         <p:spPr>
           <a:xfrm>
             <a:off x="335520" y="764640"/>
-            <a:ext cx="10728720" cy="479520"/>
+            <a:ext cx="10728360" cy="479160"/>
           </a:xfrm>
           <a:prstGeom prst="rect">
             <a:avLst/>
@@ -4626,7 +4626,7 @@
         <p:spPr>
           <a:xfrm>
             <a:off x="335520" y="1268280"/>
-            <a:ext cx="10728720" cy="5016240"/>
+            <a:ext cx="10728360" cy="5015880"/>
           </a:xfrm>
           <a:prstGeom prst="rect">
             <a:avLst/>
@@ -4738,7 +4738,7 @@
         <p:spPr>
           <a:xfrm>
             <a:off x="432720" y="1148040"/>
-            <a:ext cx="10334160" cy="474840"/>
+            <a:ext cx="10333800" cy="474480"/>
           </a:xfrm>
           <a:prstGeom prst="rect">
             <a:avLst/>
@@ -4792,7 +4792,7 @@
         <p:spPr>
           <a:xfrm>
             <a:off x="263520" y="6411600"/>
-            <a:ext cx="11073960" cy="226800"/>
+            <a:ext cx="11073600" cy="226800"/>
           </a:xfrm>
           <a:prstGeom prst="rect">
             <a:avLst/>
@@ -4846,7 +4846,7 @@
         <p:spPr>
           <a:xfrm>
             <a:off x="282240" y="2160000"/>
-            <a:ext cx="10782000" cy="1358640"/>
+            <a:ext cx="10781640" cy="1358280"/>
           </a:xfrm>
           <a:prstGeom prst="roundRect">
             <a:avLst>
@@ -4902,7 +4902,7 @@
         <p:spPr>
           <a:xfrm>
             <a:off x="540000" y="1980000"/>
-            <a:ext cx="10333800" cy="1110600"/>
+            <a:ext cx="10333440" cy="1110240"/>
           </a:xfrm>
           <a:prstGeom prst="rect">
             <a:avLst/>
@@ -5020,7 +5020,7 @@
         <p:spPr>
           <a:xfrm>
             <a:off x="335520" y="764640"/>
-            <a:ext cx="10728720" cy="479520"/>
+            <a:ext cx="10728360" cy="479160"/>
           </a:xfrm>
           <a:prstGeom prst="rect">
             <a:avLst/>
@@ -5074,7 +5074,7 @@
         <p:spPr>
           <a:xfrm>
             <a:off x="335520" y="1268280"/>
-            <a:ext cx="10728720" cy="5016240"/>
+            <a:ext cx="10728360" cy="5015880"/>
           </a:xfrm>
           <a:prstGeom prst="rect">
             <a:avLst/>
@@ -5224,7 +5224,7 @@
         <p:spPr>
           <a:xfrm>
             <a:off x="432720" y="1148040"/>
-            <a:ext cx="10334160" cy="474840"/>
+            <a:ext cx="10333800" cy="474480"/>
           </a:xfrm>
           <a:prstGeom prst="rect">
             <a:avLst/>
@@ -5278,7 +5278,7 @@
         <p:spPr>
           <a:xfrm>
             <a:off x="263520" y="6411600"/>
-            <a:ext cx="11073960" cy="226800"/>
+            <a:ext cx="11073600" cy="226800"/>
           </a:xfrm>
           <a:prstGeom prst="rect">
             <a:avLst/>
@@ -5362,7 +5362,7 @@
         <p:spPr>
           <a:xfrm>
             <a:off x="335520" y="764640"/>
-            <a:ext cx="10728720" cy="479520"/>
+            <a:ext cx="10728360" cy="479160"/>
           </a:xfrm>
           <a:prstGeom prst="rect">
             <a:avLst/>
@@ -5416,7 +5416,7 @@
         <p:spPr>
           <a:xfrm>
             <a:off x="335520" y="1268280"/>
-            <a:ext cx="10728720" cy="5016240"/>
+            <a:ext cx="10728360" cy="5015880"/>
           </a:xfrm>
           <a:prstGeom prst="rect">
             <a:avLst/>
@@ -5461,7 +5461,7 @@
         <p:spPr>
           <a:xfrm>
             <a:off x="432720" y="1148040"/>
-            <a:ext cx="10334160" cy="474840"/>
+            <a:ext cx="10333800" cy="474480"/>
           </a:xfrm>
           <a:prstGeom prst="rect">
             <a:avLst/>
@@ -5515,7 +5515,7 @@
         <p:spPr>
           <a:xfrm>
             <a:off x="264600" y="6300000"/>
-            <a:ext cx="11073960" cy="362520"/>
+            <a:ext cx="11073600" cy="362160"/>
           </a:xfrm>
           <a:prstGeom prst="rect">
             <a:avLst/>
@@ -5572,7 +5572,7 @@
         <p:spPr>
           <a:xfrm>
             <a:off x="284400" y="2078640"/>
-            <a:ext cx="11054160" cy="998640"/>
+            <a:ext cx="11053800" cy="998280"/>
           </a:xfrm>
           <a:prstGeom prst="roundRect">
             <a:avLst>
@@ -5658,7 +5658,7 @@
         <p:spPr>
           <a:xfrm>
             <a:off x="335520" y="764640"/>
-            <a:ext cx="10728720" cy="479520"/>
+            <a:ext cx="10728360" cy="479160"/>
           </a:xfrm>
           <a:prstGeom prst="rect">
             <a:avLst/>
@@ -5712,7 +5712,7 @@
         <p:spPr>
           <a:xfrm>
             <a:off x="335520" y="1268280"/>
-            <a:ext cx="10728720" cy="5016240"/>
+            <a:ext cx="10728360" cy="5015880"/>
           </a:xfrm>
           <a:prstGeom prst="rect">
             <a:avLst/>
@@ -5757,7 +5757,7 @@
         <p:spPr>
           <a:xfrm>
             <a:off x="432720" y="1148040"/>
-            <a:ext cx="10334160" cy="474840"/>
+            <a:ext cx="10333800" cy="474480"/>
           </a:xfrm>
           <a:prstGeom prst="rect">
             <a:avLst/>
@@ -5811,7 +5811,7 @@
         <p:spPr>
           <a:xfrm>
             <a:off x="264600" y="6300000"/>
-            <a:ext cx="11073960" cy="363960"/>
+            <a:ext cx="11073600" cy="363960"/>
           </a:xfrm>
           <a:prstGeom prst="rect">
             <a:avLst/>
@@ -5878,7 +5878,7 @@
         <p:spPr>
           <a:xfrm>
             <a:off x="284400" y="2078640"/>
-            <a:ext cx="11054160" cy="998640"/>
+            <a:ext cx="11053800" cy="998280"/>
           </a:xfrm>
           <a:prstGeom prst="roundRect">
             <a:avLst>
@@ -5934,7 +5934,7 @@
         <p:spPr>
           <a:xfrm>
             <a:off x="540000" y="2078640"/>
-            <a:ext cx="10618560" cy="884880"/>
+            <a:ext cx="10618200" cy="884520"/>
           </a:xfrm>
           <a:prstGeom prst="rect">
             <a:avLst/>
@@ -6038,7 +6038,7 @@
         <p:spPr>
           <a:xfrm>
             <a:off x="335520" y="764640"/>
-            <a:ext cx="10728720" cy="479520"/>
+            <a:ext cx="10728360" cy="479160"/>
           </a:xfrm>
           <a:prstGeom prst="rect">
             <a:avLst/>
@@ -6092,7 +6092,7 @@
         <p:spPr>
           <a:xfrm>
             <a:off x="335520" y="1268280"/>
-            <a:ext cx="10728720" cy="5016240"/>
+            <a:ext cx="10728360" cy="5015880"/>
           </a:xfrm>
           <a:prstGeom prst="rect">
             <a:avLst/>
@@ -6137,7 +6137,7 @@
         <p:spPr>
           <a:xfrm>
             <a:off x="432720" y="1148040"/>
-            <a:ext cx="10334160" cy="474840"/>
+            <a:ext cx="10333800" cy="474480"/>
           </a:xfrm>
           <a:prstGeom prst="rect">
             <a:avLst/>
@@ -6191,7 +6191,7 @@
         <p:spPr>
           <a:xfrm>
             <a:off x="264600" y="6300000"/>
-            <a:ext cx="11073960" cy="363960"/>
+            <a:ext cx="11073600" cy="363960"/>
           </a:xfrm>
           <a:prstGeom prst="rect">
             <a:avLst/>
@@ -6268,7 +6268,7 @@
         <p:spPr>
           <a:xfrm>
             <a:off x="284400" y="2078640"/>
-            <a:ext cx="11054160" cy="998640"/>
+            <a:ext cx="11053800" cy="998280"/>
           </a:xfrm>
           <a:prstGeom prst="roundRect">
             <a:avLst>
@@ -6324,7 +6324,7 @@
         <p:spPr>
           <a:xfrm>
             <a:off x="540000" y="2078640"/>
-            <a:ext cx="10618560" cy="884880"/>
+            <a:ext cx="10618200" cy="884520"/>
           </a:xfrm>
           <a:prstGeom prst="rect">
             <a:avLst/>
@@ -6398,7 +6398,7 @@
         <p:spPr>
           <a:xfrm>
             <a:off x="360000" y="3780000"/>
-            <a:ext cx="10618560" cy="898560"/>
+            <a:ext cx="10618200" cy="898200"/>
           </a:xfrm>
           <a:prstGeom prst="rect">
             <a:avLst/>
@@ -6472,7 +6472,7 @@
         <p:spPr>
           <a:xfrm>
             <a:off x="284400" y="3679920"/>
-            <a:ext cx="11054160" cy="1178640"/>
+            <a:ext cx="11053800" cy="1178280"/>
           </a:xfrm>
           <a:prstGeom prst="roundRect">
             <a:avLst>
@@ -6558,7 +6558,7 @@
         <p:spPr>
           <a:xfrm>
             <a:off x="335520" y="764640"/>
-            <a:ext cx="10728720" cy="479520"/>
+            <a:ext cx="10728360" cy="479160"/>
           </a:xfrm>
           <a:prstGeom prst="rect">
             <a:avLst/>
@@ -6612,7 +6612,7 @@
         <p:spPr>
           <a:xfrm>
             <a:off x="335520" y="1268280"/>
-            <a:ext cx="10728720" cy="5016240"/>
+            <a:ext cx="10728360" cy="5015880"/>
           </a:xfrm>
           <a:prstGeom prst="rect">
             <a:avLst/>
@@ -6657,7 +6657,7 @@
         <p:spPr>
           <a:xfrm>
             <a:off x="432720" y="1148040"/>
-            <a:ext cx="10334160" cy="474840"/>
+            <a:ext cx="10333800" cy="474480"/>
           </a:xfrm>
           <a:prstGeom prst="rect">
             <a:avLst/>
@@ -6711,7 +6711,7 @@
         <p:spPr>
           <a:xfrm>
             <a:off x="264600" y="6300000"/>
-            <a:ext cx="11073960" cy="363960"/>
+            <a:ext cx="11073600" cy="363960"/>
           </a:xfrm>
           <a:prstGeom prst="rect">
             <a:avLst/>
@@ -6788,7 +6788,7 @@
         <p:spPr>
           <a:xfrm>
             <a:off x="284400" y="2078640"/>
-            <a:ext cx="11054160" cy="998640"/>
+            <a:ext cx="11053800" cy="998280"/>
           </a:xfrm>
           <a:prstGeom prst="roundRect">
             <a:avLst>
@@ -6844,7 +6844,7 @@
         <p:spPr>
           <a:xfrm>
             <a:off x="540000" y="2078640"/>
-            <a:ext cx="10618560" cy="884880"/>
+            <a:ext cx="10618200" cy="884520"/>
           </a:xfrm>
           <a:prstGeom prst="rect">
             <a:avLst/>
@@ -6918,7 +6918,7 @@
         <p:spPr>
           <a:xfrm>
             <a:off x="360000" y="3780000"/>
-            <a:ext cx="10618560" cy="898560"/>
+            <a:ext cx="10618200" cy="898200"/>
           </a:xfrm>
           <a:prstGeom prst="rect">
             <a:avLst/>
@@ -6992,7 +6992,7 @@
         <p:spPr>
           <a:xfrm>
             <a:off x="284400" y="3679920"/>
-            <a:ext cx="11054160" cy="1178640"/>
+            <a:ext cx="11053800" cy="1178280"/>
           </a:xfrm>
           <a:prstGeom prst="roundRect">
             <a:avLst>
@@ -7048,7 +7048,7 @@
         <p:spPr>
           <a:xfrm>
             <a:off x="3500640" y="5400000"/>
-            <a:ext cx="4957920" cy="619560"/>
+            <a:ext cx="4957560" cy="619200"/>
           </a:xfrm>
           <a:prstGeom prst="rect">
             <a:avLst/>
@@ -7152,7 +7152,7 @@
         <p:spPr>
           <a:xfrm>
             <a:off x="335520" y="764640"/>
-            <a:ext cx="10725840" cy="476640"/>
+            <a:ext cx="10725480" cy="476280"/>
           </a:xfrm>
           <a:prstGeom prst="rect">
             <a:avLst/>
@@ -7206,7 +7206,7 @@
         <p:spPr>
           <a:xfrm>
             <a:off x="335520" y="1268280"/>
-            <a:ext cx="10725840" cy="5013360"/>
+            <a:ext cx="10725480" cy="5013000"/>
           </a:xfrm>
           <a:prstGeom prst="rect">
             <a:avLst/>
@@ -7440,7 +7440,7 @@
         <p:spPr>
           <a:xfrm>
             <a:off x="335520" y="764640"/>
-            <a:ext cx="10728720" cy="479520"/>
+            <a:ext cx="10728360" cy="479160"/>
           </a:xfrm>
           <a:prstGeom prst="rect">
             <a:avLst/>
@@ -7494,7 +7494,7 @@
         <p:spPr>
           <a:xfrm>
             <a:off x="335520" y="1268280"/>
-            <a:ext cx="10728720" cy="5016240"/>
+            <a:ext cx="10728360" cy="5015880"/>
           </a:xfrm>
           <a:prstGeom prst="rect">
             <a:avLst/>
@@ -7650,6 +7650,59 @@
             </a:endParaRPr>
           </a:p>
           <a:p>
+            <a:pPr>
+              <a:lnSpc>
+                <a:spcPct val="100000"/>
+              </a:lnSpc>
+              <a:spcBef>
+                <a:spcPts val="360"/>
+              </a:spcBef>
+            </a:pPr>
+            <a:r>
+              <a:rPr b="0" lang="en-GB" sz="1800" spc="-1" strike="noStrike" u="sng">
+                <a:solidFill>
+                  <a:srgbClr val="ffffff"/>
+                </a:solidFill>
+                <a:uFillTx/>
+                <a:latin typeface="DejaVu Sans"/>
+                <a:ea typeface="DejaVu Sans"/>
+              </a:rPr>
+              <a:t>Energy-)efficiency:</a:t>
+            </a:r>
+            <a:r>
+              <a:rPr b="0" lang="en-GB" sz="1800" spc="-1" strike="noStrike">
+                <a:solidFill>
+                  <a:srgbClr val="ffffff"/>
+                </a:solidFill>
+                <a:latin typeface="DejaVu Sans"/>
+                <a:ea typeface="DejaVu Sans"/>
+              </a:rPr>
+              <a:t> Well-insulated houses and highly-efficient heating systems require less energy to heat the apartment, i.e., minimize the heat demand as much as possible</a:t>
+            </a:r>
+            <a:endParaRPr b="0" lang="en-GB" sz="1800" spc="-1" strike="noStrike">
+              <a:solidFill>
+                <a:srgbClr val="000000"/>
+              </a:solidFill>
+              <a:latin typeface="Arial"/>
+            </a:endParaRPr>
+          </a:p>
+          <a:p>
+            <a:pPr>
+              <a:lnSpc>
+                <a:spcPct val="100000"/>
+              </a:lnSpc>
+              <a:spcBef>
+                <a:spcPts val="360"/>
+              </a:spcBef>
+            </a:pPr>
+            <a:endParaRPr b="0" lang="en-GB" sz="1800" spc="-1" strike="noStrike">
+              <a:solidFill>
+                <a:srgbClr val="000000"/>
+              </a:solidFill>
+              <a:latin typeface="Arial"/>
+            </a:endParaRPr>
+          </a:p>
+          <a:p>
             <a:pPr marL="216000" indent="-216000">
               <a:lnSpc>
                 <a:spcPct val="100000"/>
@@ -7673,7 +7726,7 @@
                 <a:latin typeface="DejaVu Sans"/>
                 <a:ea typeface="DejaVu Sans"/>
               </a:rPr>
-              <a:t>Energy-)efficiency:</a:t>
+              <a:t>Consistency:</a:t>
             </a:r>
             <a:r>
               <a:rPr b="0" lang="en-GB" sz="1800" spc="-1" strike="noStrike">
@@ -7683,7 +7736,7 @@
                 <a:latin typeface="DejaVu Sans"/>
                 <a:ea typeface="DejaVu Sans"/>
               </a:rPr>
-              <a:t> Well-insulated houses and highly-efficient heating systems require less energy to heat the apartment, i.e., minimize the heat demand as much as possible</a:t>
+              <a:t> Minimize ecological damage by choosing the most sustainable way of heating</a:t>
             </a:r>
             <a:endParaRPr b="0" lang="en-GB" sz="1800" spc="-1" strike="noStrike">
               <a:solidFill>
@@ -7709,19 +7762,13 @@
             </a:endParaRPr>
           </a:p>
           <a:p>
-            <a:pPr marL="216000" indent="-216000">
+            <a:pPr>
               <a:lnSpc>
                 <a:spcPct val="100000"/>
               </a:lnSpc>
               <a:spcBef>
                 <a:spcPts val="360"/>
               </a:spcBef>
-              <a:buClr>
-                <a:srgbClr val="008c4f"/>
-              </a:buClr>
-              <a:buSzPct val="45000"/>
-              <a:buFont typeface="Monotype Sorts" charset="2"/>
-              <a:buChar char=""/>
             </a:pPr>
             <a:r>
               <a:rPr b="0" lang="en-GB" sz="1800" spc="-1" strike="noStrike" u="sng">
@@ -7732,7 +7779,7 @@
                 <a:latin typeface="DejaVu Sans"/>
                 <a:ea typeface="DejaVu Sans"/>
               </a:rPr>
-              <a:t>Consistency:</a:t>
+              <a:t>Sufficiency:</a:t>
             </a:r>
             <a:r>
               <a:rPr b="0" lang="en-GB" sz="1800" spc="-1" strike="noStrike">
@@ -7742,59 +7789,6 @@
                 <a:latin typeface="DejaVu Sans"/>
                 <a:ea typeface="DejaVu Sans"/>
               </a:rPr>
-              <a:t> Minimize ecological damage by choosing the most sustainable way of heating</a:t>
-            </a:r>
-            <a:endParaRPr b="0" lang="en-GB" sz="1800" spc="-1" strike="noStrike">
-              <a:solidFill>
-                <a:srgbClr val="000000"/>
-              </a:solidFill>
-              <a:latin typeface="Arial"/>
-            </a:endParaRPr>
-          </a:p>
-          <a:p>
-            <a:pPr>
-              <a:lnSpc>
-                <a:spcPct val="100000"/>
-              </a:lnSpc>
-              <a:spcBef>
-                <a:spcPts val="360"/>
-              </a:spcBef>
-            </a:pPr>
-            <a:endParaRPr b="0" lang="en-GB" sz="1800" spc="-1" strike="noStrike">
-              <a:solidFill>
-                <a:srgbClr val="000000"/>
-              </a:solidFill>
-              <a:latin typeface="Arial"/>
-            </a:endParaRPr>
-          </a:p>
-          <a:p>
-            <a:pPr>
-              <a:lnSpc>
-                <a:spcPct val="100000"/>
-              </a:lnSpc>
-              <a:spcBef>
-                <a:spcPts val="360"/>
-              </a:spcBef>
-            </a:pPr>
-            <a:r>
-              <a:rPr b="0" lang="en-GB" sz="1800" spc="-1" strike="noStrike" u="sng">
-                <a:solidFill>
-                  <a:srgbClr val="ffffff"/>
-                </a:solidFill>
-                <a:uFillTx/>
-                <a:latin typeface="DejaVu Sans"/>
-                <a:ea typeface="DejaVu Sans"/>
-              </a:rPr>
-              <a:t>Sufficiency:</a:t>
-            </a:r>
-            <a:r>
-              <a:rPr b="0" lang="en-GB" sz="1800" spc="-1" strike="noStrike">
-                <a:solidFill>
-                  <a:srgbClr val="ffffff"/>
-                </a:solidFill>
-                <a:latin typeface="DejaVu Sans"/>
-                <a:ea typeface="DejaVu Sans"/>
-              </a:rPr>
               <a:t> Live in a smaller apartment (or utilize less space per person)</a:t>
             </a:r>
             <a:endParaRPr b="0" lang="en-GB" sz="1800" spc="-1" strike="noStrike">
@@ -7815,7 +7809,7 @@
         <p:spPr>
           <a:xfrm>
             <a:off x="432720" y="1148040"/>
-            <a:ext cx="10334160" cy="474840"/>
+            <a:ext cx="10333800" cy="474480"/>
           </a:xfrm>
           <a:prstGeom prst="rect">
             <a:avLst/>
@@ -7879,7 +7873,7 @@
         <p:spPr>
           <a:xfrm>
             <a:off x="263520" y="6411600"/>
-            <a:ext cx="11073960" cy="226800"/>
+            <a:ext cx="11073600" cy="226800"/>
           </a:xfrm>
           <a:prstGeom prst="rect">
             <a:avLst/>
@@ -7963,7 +7957,7 @@
         <p:spPr>
           <a:xfrm>
             <a:off x="335520" y="764640"/>
-            <a:ext cx="10728720" cy="479520"/>
+            <a:ext cx="10728360" cy="479160"/>
           </a:xfrm>
           <a:prstGeom prst="rect">
             <a:avLst/>
@@ -8017,7 +8011,7 @@
         <p:spPr>
           <a:xfrm>
             <a:off x="335520" y="1268280"/>
-            <a:ext cx="10728720" cy="5016240"/>
+            <a:ext cx="10728360" cy="5015880"/>
           </a:xfrm>
           <a:prstGeom prst="rect">
             <a:avLst/>
@@ -8338,7 +8332,7 @@
         <p:spPr>
           <a:xfrm>
             <a:off x="432720" y="1148040"/>
-            <a:ext cx="10334160" cy="474840"/>
+            <a:ext cx="10333800" cy="474480"/>
           </a:xfrm>
           <a:prstGeom prst="rect">
             <a:avLst/>
@@ -8402,7 +8396,7 @@
         <p:spPr>
           <a:xfrm>
             <a:off x="263520" y="6411600"/>
-            <a:ext cx="11073960" cy="226800"/>
+            <a:ext cx="11073600" cy="226800"/>
           </a:xfrm>
           <a:prstGeom prst="rect">
             <a:avLst/>
@@ -8486,7 +8480,7 @@
         <p:spPr>
           <a:xfrm>
             <a:off x="335520" y="764640"/>
-            <a:ext cx="10728720" cy="479520"/>
+            <a:ext cx="10728360" cy="479160"/>
           </a:xfrm>
           <a:prstGeom prst="rect">
             <a:avLst/>
@@ -8540,7 +8534,7 @@
         <p:spPr>
           <a:xfrm>
             <a:off x="335520" y="1268280"/>
-            <a:ext cx="10728720" cy="5016240"/>
+            <a:ext cx="10728360" cy="5015880"/>
           </a:xfrm>
           <a:prstGeom prst="rect">
             <a:avLst/>
@@ -8861,7 +8855,7 @@
         <p:spPr>
           <a:xfrm>
             <a:off x="432720" y="1148040"/>
-            <a:ext cx="10334160" cy="474840"/>
+            <a:ext cx="10333800" cy="474480"/>
           </a:xfrm>
           <a:prstGeom prst="rect">
             <a:avLst/>
@@ -8925,7 +8919,7 @@
         <p:spPr>
           <a:xfrm>
             <a:off x="263520" y="6411600"/>
-            <a:ext cx="11073960" cy="226800"/>
+            <a:ext cx="11073600" cy="226800"/>
           </a:xfrm>
           <a:prstGeom prst="rect">
             <a:avLst/>
@@ -9009,7 +9003,7 @@
         <p:spPr>
           <a:xfrm>
             <a:off x="335520" y="764640"/>
-            <a:ext cx="10728720" cy="479520"/>
+            <a:ext cx="10728360" cy="479160"/>
           </a:xfrm>
           <a:prstGeom prst="rect">
             <a:avLst/>
@@ -9063,7 +9057,7 @@
         <p:spPr>
           <a:xfrm>
             <a:off x="335520" y="1268280"/>
-            <a:ext cx="10728720" cy="5016240"/>
+            <a:ext cx="10728360" cy="5015880"/>
           </a:xfrm>
           <a:prstGeom prst="rect">
             <a:avLst/>
@@ -9390,7 +9384,7 @@
         <p:spPr>
           <a:xfrm>
             <a:off x="432720" y="1148040"/>
-            <a:ext cx="10334160" cy="474840"/>
+            <a:ext cx="10333800" cy="474480"/>
           </a:xfrm>
           <a:prstGeom prst="rect">
             <a:avLst/>
@@ -9454,7 +9448,7 @@
         <p:spPr>
           <a:xfrm>
             <a:off x="263520" y="6411600"/>
-            <a:ext cx="11073960" cy="226800"/>
+            <a:ext cx="11073600" cy="226800"/>
           </a:xfrm>
           <a:prstGeom prst="rect">
             <a:avLst/>
@@ -9538,7 +9532,7 @@
         <p:spPr>
           <a:xfrm>
             <a:off x="335520" y="764640"/>
-            <a:ext cx="10728720" cy="479520"/>
+            <a:ext cx="10728360" cy="479160"/>
           </a:xfrm>
           <a:prstGeom prst="rect">
             <a:avLst/>
@@ -9592,7 +9586,7 @@
         <p:spPr>
           <a:xfrm>
             <a:off x="335520" y="1268280"/>
-            <a:ext cx="10728720" cy="5016240"/>
+            <a:ext cx="10728360" cy="5015880"/>
           </a:xfrm>
           <a:prstGeom prst="rect">
             <a:avLst/>
@@ -9861,7 +9855,7 @@
         <p:spPr>
           <a:xfrm>
             <a:off x="432720" y="1148040"/>
-            <a:ext cx="10334160" cy="474840"/>
+            <a:ext cx="10333800" cy="474480"/>
           </a:xfrm>
           <a:prstGeom prst="rect">
             <a:avLst/>
@@ -9925,7 +9919,7 @@
         <p:spPr>
           <a:xfrm>
             <a:off x="263520" y="6411600"/>
-            <a:ext cx="11073960" cy="226800"/>
+            <a:ext cx="11073600" cy="226800"/>
           </a:xfrm>
           <a:prstGeom prst="rect">
             <a:avLst/>
@@ -10009,7 +10003,7 @@
         <p:spPr>
           <a:xfrm>
             <a:off x="335520" y="764640"/>
-            <a:ext cx="10728720" cy="479520"/>
+            <a:ext cx="10728360" cy="479160"/>
           </a:xfrm>
           <a:prstGeom prst="rect">
             <a:avLst/>
@@ -10063,7 +10057,7 @@
         <p:spPr>
           <a:xfrm>
             <a:off x="335520" y="1268280"/>
-            <a:ext cx="10728720" cy="5016240"/>
+            <a:ext cx="10728360" cy="5015880"/>
           </a:xfrm>
           <a:prstGeom prst="rect">
             <a:avLst/>
@@ -10326,7 +10320,7 @@
         <p:spPr>
           <a:xfrm>
             <a:off x="432720" y="1148040"/>
-            <a:ext cx="10334160" cy="474840"/>
+            <a:ext cx="10333800" cy="474480"/>
           </a:xfrm>
           <a:prstGeom prst="rect">
             <a:avLst/>
@@ -10390,7 +10384,7 @@
         <p:spPr>
           <a:xfrm>
             <a:off x="263520" y="6411600"/>
-            <a:ext cx="11073960" cy="226800"/>
+            <a:ext cx="11073600" cy="226800"/>
           </a:xfrm>
           <a:prstGeom prst="rect">
             <a:avLst/>
@@ -10474,7 +10468,7 @@
         <p:spPr>
           <a:xfrm>
             <a:off x="335520" y="764640"/>
-            <a:ext cx="10728720" cy="479520"/>
+            <a:ext cx="10728360" cy="479160"/>
           </a:xfrm>
           <a:prstGeom prst="rect">
             <a:avLst/>
@@ -10528,7 +10522,7 @@
         <p:spPr>
           <a:xfrm>
             <a:off x="335520" y="1268280"/>
-            <a:ext cx="10728720" cy="5016240"/>
+            <a:ext cx="10728360" cy="5015880"/>
           </a:xfrm>
           <a:prstGeom prst="rect">
             <a:avLst/>
@@ -10573,7 +10567,7 @@
         <p:spPr>
           <a:xfrm>
             <a:off x="432720" y="1148040"/>
-            <a:ext cx="10334160" cy="474840"/>
+            <a:ext cx="10333800" cy="474480"/>
           </a:xfrm>
           <a:prstGeom prst="rect">
             <a:avLst/>
@@ -10627,7 +10621,7 @@
         <p:spPr>
           <a:xfrm>
             <a:off x="263520" y="6411600"/>
-            <a:ext cx="11073960" cy="226800"/>
+            <a:ext cx="11073600" cy="226800"/>
           </a:xfrm>
           <a:prstGeom prst="rect">
             <a:avLst/>
@@ -10685,7 +10679,7 @@
         <p:spPr>
           <a:xfrm>
             <a:off x="2231280" y="1833480"/>
-            <a:ext cx="6292800" cy="3420360"/>
+            <a:ext cx="6292440" cy="3420000"/>
           </a:xfrm>
           <a:prstGeom prst="rect">
             <a:avLst/>
@@ -10704,7 +10698,7 @@
         <p:spPr>
           <a:xfrm>
             <a:off x="1620000" y="5511600"/>
-            <a:ext cx="1619640" cy="772920"/>
+            <a:ext cx="1619280" cy="772560"/>
           </a:xfrm>
           <a:prstGeom prst="wedgeRectCallout">
             <a:avLst>
@@ -10791,7 +10785,7 @@
         <p:spPr>
           <a:xfrm>
             <a:off x="3600000" y="5511600"/>
-            <a:ext cx="1439640" cy="772920"/>
+            <a:ext cx="1439280" cy="772560"/>
           </a:xfrm>
           <a:prstGeom prst="wedgeRectCallout">
             <a:avLst>
@@ -10878,7 +10872,7 @@
         <p:spPr>
           <a:xfrm>
             <a:off x="5400000" y="5580000"/>
-            <a:ext cx="2879640" cy="704520"/>
+            <a:ext cx="2879280" cy="704160"/>
           </a:xfrm>
           <a:prstGeom prst="wedgeRectCallout">
             <a:avLst>
@@ -11018,7 +11012,7 @@
         <p:spPr>
           <a:xfrm>
             <a:off x="335520" y="4406760"/>
-            <a:ext cx="10724040" cy="1333080"/>
+            <a:ext cx="10723680" cy="1332720"/>
           </a:xfrm>
           <a:prstGeom prst="rect">
             <a:avLst/>
@@ -11072,7 +11066,7 @@
         <p:spPr>
           <a:xfrm>
             <a:off x="335520" y="2906640"/>
-            <a:ext cx="10724040" cy="1470960"/>
+            <a:ext cx="10723680" cy="1470600"/>
           </a:xfrm>
           <a:prstGeom prst="rect">
             <a:avLst/>
@@ -11147,7 +11141,7 @@
         <p:spPr>
           <a:xfrm>
             <a:off x="335520" y="764640"/>
-            <a:ext cx="10733400" cy="484200"/>
+            <a:ext cx="10733040" cy="483840"/>
           </a:xfrm>
           <a:prstGeom prst="rect">
             <a:avLst/>
@@ -11201,7 +11195,7 @@
         <p:spPr>
           <a:xfrm>
             <a:off x="335520" y="1244520"/>
-            <a:ext cx="10733400" cy="4332960"/>
+            <a:ext cx="10733040" cy="4332600"/>
           </a:xfrm>
           <a:prstGeom prst="rect">
             <a:avLst/>
@@ -11278,7 +11272,7 @@
         <p:spPr>
           <a:xfrm>
             <a:off x="432720" y="1148040"/>
-            <a:ext cx="10342440" cy="483120"/>
+            <a:ext cx="10342080" cy="482760"/>
           </a:xfrm>
           <a:prstGeom prst="rect">
             <a:avLst/>
@@ -11332,7 +11326,7 @@
         <p:spPr>
           <a:xfrm>
             <a:off x="335520" y="2778480"/>
-            <a:ext cx="10782360" cy="1359000"/>
+            <a:ext cx="10782000" cy="1358640"/>
           </a:xfrm>
           <a:prstGeom prst="roundRect">
             <a:avLst>
@@ -11388,7 +11382,7 @@
         <p:spPr>
           <a:xfrm>
             <a:off x="335520" y="1268280"/>
-            <a:ext cx="10728720" cy="5016240"/>
+            <a:ext cx="10728360" cy="5015880"/>
           </a:xfrm>
           <a:prstGeom prst="rect">
             <a:avLst/>
@@ -11704,7 +11698,7 @@
         <p:spPr>
           <a:xfrm>
             <a:off x="335520" y="764640"/>
-            <a:ext cx="10733400" cy="484200"/>
+            <a:ext cx="10733040" cy="483840"/>
           </a:xfrm>
           <a:prstGeom prst="rect">
             <a:avLst/>
@@ -11758,7 +11752,7 @@
         <p:spPr>
           <a:xfrm>
             <a:off x="335520" y="1244520"/>
-            <a:ext cx="10733400" cy="4332960"/>
+            <a:ext cx="10733040" cy="4332600"/>
           </a:xfrm>
           <a:prstGeom prst="rect">
             <a:avLst/>
@@ -11835,7 +11829,7 @@
         <p:spPr>
           <a:xfrm>
             <a:off x="432720" y="1148040"/>
-            <a:ext cx="10342440" cy="483120"/>
+            <a:ext cx="10342080" cy="482760"/>
           </a:xfrm>
           <a:prstGeom prst="rect">
             <a:avLst/>
@@ -11889,7 +11883,7 @@
         <p:spPr>
           <a:xfrm>
             <a:off x="335520" y="2778480"/>
-            <a:ext cx="10782360" cy="1359000"/>
+            <a:ext cx="10782000" cy="1358640"/>
           </a:xfrm>
           <a:prstGeom prst="roundRect">
             <a:avLst>
@@ -11945,7 +11939,7 @@
         <p:spPr>
           <a:xfrm>
             <a:off x="335520" y="1268280"/>
-            <a:ext cx="10728720" cy="5016240"/>
+            <a:ext cx="10728360" cy="5015880"/>
           </a:xfrm>
           <a:prstGeom prst="rect">
             <a:avLst/>
@@ -12267,7 +12261,7 @@
         <p:spPr>
           <a:xfrm>
             <a:off x="335520" y="4406760"/>
-            <a:ext cx="10724040" cy="1333080"/>
+            <a:ext cx="10723680" cy="1332720"/>
           </a:xfrm>
           <a:prstGeom prst="rect">
             <a:avLst/>
@@ -12321,7 +12315,7 @@
         <p:spPr>
           <a:xfrm>
             <a:off x="335520" y="2906640"/>
-            <a:ext cx="10724040" cy="1470960"/>
+            <a:ext cx="10723680" cy="1470600"/>
           </a:xfrm>
           <a:prstGeom prst="rect">
             <a:avLst/>
@@ -12396,7 +12390,7 @@
         <p:spPr>
           <a:xfrm>
             <a:off x="335520" y="764640"/>
-            <a:ext cx="10733400" cy="484200"/>
+            <a:ext cx="10733040" cy="483840"/>
           </a:xfrm>
           <a:prstGeom prst="rect">
             <a:avLst/>
@@ -12450,7 +12444,7 @@
         <p:spPr>
           <a:xfrm>
             <a:off x="335520" y="1244520"/>
-            <a:ext cx="10733400" cy="4332960"/>
+            <a:ext cx="10733040" cy="4332600"/>
           </a:xfrm>
           <a:prstGeom prst="rect">
             <a:avLst/>
@@ -12527,7 +12521,7 @@
         <p:spPr>
           <a:xfrm>
             <a:off x="432720" y="1148040"/>
-            <a:ext cx="10342440" cy="483120"/>
+            <a:ext cx="10342080" cy="482760"/>
           </a:xfrm>
           <a:prstGeom prst="rect">
             <a:avLst/>
@@ -12581,7 +12575,7 @@
         <p:spPr>
           <a:xfrm>
             <a:off x="335520" y="2778480"/>
-            <a:ext cx="10782360" cy="1359000"/>
+            <a:ext cx="10782000" cy="1358640"/>
           </a:xfrm>
           <a:prstGeom prst="roundRect">
             <a:avLst>
@@ -12637,7 +12631,7 @@
         <p:spPr>
           <a:xfrm>
             <a:off x="335520" y="1268280"/>
-            <a:ext cx="10728720" cy="5016240"/>
+            <a:ext cx="10728360" cy="5015880"/>
           </a:xfrm>
           <a:prstGeom prst="rect">
             <a:avLst/>
@@ -12985,7 +12979,7 @@
         <p:spPr>
           <a:xfrm>
             <a:off x="335520" y="764640"/>
-            <a:ext cx="10728720" cy="479520"/>
+            <a:ext cx="10728360" cy="479160"/>
           </a:xfrm>
           <a:prstGeom prst="rect">
             <a:avLst/>
@@ -13039,7 +13033,7 @@
         <p:spPr>
           <a:xfrm>
             <a:off x="335520" y="1268280"/>
-            <a:ext cx="10728720" cy="5016240"/>
+            <a:ext cx="10728360" cy="5015880"/>
           </a:xfrm>
           <a:prstGeom prst="rect">
             <a:avLst/>
@@ -13119,7 +13113,7 @@
         <p:spPr>
           <a:xfrm>
             <a:off x="432720" y="1148040"/>
-            <a:ext cx="10334160" cy="474840"/>
+            <a:ext cx="10333800" cy="474480"/>
           </a:xfrm>
           <a:prstGeom prst="rect">
             <a:avLst/>
@@ -13173,7 +13167,7 @@
         <p:spPr>
           <a:xfrm>
             <a:off x="198000" y="3420000"/>
-            <a:ext cx="10779480" cy="998640"/>
+            <a:ext cx="10779120" cy="998280"/>
           </a:xfrm>
           <a:prstGeom prst="roundRect">
             <a:avLst>
@@ -13259,7 +13253,7 @@
         <p:spPr>
           <a:xfrm>
             <a:off x="335520" y="764640"/>
-            <a:ext cx="10728720" cy="479520"/>
+            <a:ext cx="10728360" cy="479160"/>
           </a:xfrm>
           <a:prstGeom prst="rect">
             <a:avLst/>
@@ -13313,7 +13307,7 @@
         <p:spPr>
           <a:xfrm>
             <a:off x="432720" y="1148040"/>
-            <a:ext cx="10334160" cy="474840"/>
+            <a:ext cx="10333800" cy="474480"/>
           </a:xfrm>
           <a:prstGeom prst="rect">
             <a:avLst/>
@@ -13367,7 +13361,7 @@
         <p:spPr>
           <a:xfrm>
             <a:off x="335520" y="1268280"/>
-            <a:ext cx="10724400" cy="5011920"/>
+            <a:ext cx="10724040" cy="5011560"/>
           </a:xfrm>
           <a:prstGeom prst="rect">
             <a:avLst/>
@@ -13580,7 +13574,7 @@
         <p:spPr>
           <a:xfrm>
             <a:off x="335520" y="764640"/>
-            <a:ext cx="10728720" cy="479520"/>
+            <a:ext cx="10728360" cy="479160"/>
           </a:xfrm>
           <a:prstGeom prst="rect">
             <a:avLst/>
@@ -13634,7 +13628,7 @@
         <p:spPr>
           <a:xfrm>
             <a:off x="432720" y="1148040"/>
-            <a:ext cx="10334160" cy="474840"/>
+            <a:ext cx="10333800" cy="474480"/>
           </a:xfrm>
           <a:prstGeom prst="rect">
             <a:avLst/>
@@ -13688,7 +13682,7 @@
         <p:spPr>
           <a:xfrm>
             <a:off x="335520" y="1268280"/>
-            <a:ext cx="10724400" cy="5011920"/>
+            <a:ext cx="10724040" cy="5011560"/>
           </a:xfrm>
           <a:prstGeom prst="rect">
             <a:avLst/>
@@ -13901,7 +13895,7 @@
         <p:spPr>
           <a:xfrm>
             <a:off x="335520" y="764640"/>
-            <a:ext cx="10730520" cy="481320"/>
+            <a:ext cx="10730160" cy="480960"/>
           </a:xfrm>
           <a:prstGeom prst="rect">
             <a:avLst/>
@@ -13955,7 +13949,7 @@
         <p:spPr>
           <a:xfrm>
             <a:off x="432720" y="1148040"/>
-            <a:ext cx="10339560" cy="480240"/>
+            <a:ext cx="10339200" cy="479880"/>
           </a:xfrm>
           <a:prstGeom prst="rect">
             <a:avLst/>
@@ -14009,7 +14003,7 @@
         <p:spPr>
           <a:xfrm>
             <a:off x="5943600" y="3276720"/>
-            <a:ext cx="4220280" cy="4220280"/>
+            <a:ext cx="4219920" cy="4219920"/>
           </a:xfrm>
           <a:prstGeom prst="rect">
             <a:avLst/>
@@ -14054,7 +14048,7 @@
         <p:spPr>
           <a:xfrm>
             <a:off x="263520" y="6442920"/>
-            <a:ext cx="10785240" cy="501120"/>
+            <a:ext cx="10784880" cy="501120"/>
           </a:xfrm>
           <a:prstGeom prst="rect">
             <a:avLst/>
@@ -14145,7 +14139,7 @@
         <p:spPr>
           <a:xfrm>
             <a:off x="1347120" y="1853640"/>
-            <a:ext cx="8314920" cy="4397040"/>
+            <a:ext cx="8314560" cy="4396680"/>
           </a:xfrm>
           <a:prstGeom prst="rect">
             <a:avLst/>
@@ -14194,7 +14188,7 @@
         <p:spPr>
           <a:xfrm>
             <a:off x="335520" y="764640"/>
-            <a:ext cx="10730520" cy="481320"/>
+            <a:ext cx="10730160" cy="480960"/>
           </a:xfrm>
           <a:prstGeom prst="rect">
             <a:avLst/>
@@ -14248,7 +14242,7 @@
         <p:spPr>
           <a:xfrm>
             <a:off x="432720" y="1148040"/>
-            <a:ext cx="10339560" cy="480240"/>
+            <a:ext cx="10339200" cy="479880"/>
           </a:xfrm>
           <a:prstGeom prst="rect">
             <a:avLst/>
@@ -14302,7 +14296,7 @@
         <p:spPr>
           <a:xfrm>
             <a:off x="335520" y="1268280"/>
-            <a:ext cx="10728720" cy="5016240"/>
+            <a:ext cx="10728360" cy="5015880"/>
           </a:xfrm>
           <a:prstGeom prst="rect">
             <a:avLst/>
@@ -14492,7 +14486,7 @@
         <p:spPr>
           <a:xfrm>
             <a:off x="335520" y="764640"/>
-            <a:ext cx="10730520" cy="481320"/>
+            <a:ext cx="10730160" cy="480960"/>
           </a:xfrm>
           <a:prstGeom prst="rect">
             <a:avLst/>
@@ -14546,7 +14540,7 @@
         <p:spPr>
           <a:xfrm>
             <a:off x="335520" y="1268280"/>
-            <a:ext cx="10730520" cy="5018040"/>
+            <a:ext cx="10730160" cy="5017680"/>
           </a:xfrm>
           <a:prstGeom prst="rect">
             <a:avLst/>
@@ -14626,7 +14620,7 @@
         <p:spPr>
           <a:xfrm>
             <a:off x="432720" y="1148040"/>
-            <a:ext cx="10339560" cy="480240"/>
+            <a:ext cx="10339200" cy="479880"/>
           </a:xfrm>
           <a:prstGeom prst="rect">
             <a:avLst/>
@@ -14680,7 +14674,7 @@
         <p:spPr>
           <a:xfrm>
             <a:off x="335520" y="3291840"/>
-            <a:ext cx="10779480" cy="1356120"/>
+            <a:ext cx="10779120" cy="1355760"/>
           </a:xfrm>
           <a:prstGeom prst="roundRect">
             <a:avLst>
@@ -14736,7 +14730,7 @@
         <p:spPr>
           <a:xfrm>
             <a:off x="263520" y="6492240"/>
-            <a:ext cx="10785240" cy="226800"/>
+            <a:ext cx="10784880" cy="226800"/>
           </a:xfrm>
           <a:prstGeom prst="rect">
             <a:avLst/>
@@ -14790,7 +14784,7 @@
         <p:spPr>
           <a:xfrm>
             <a:off x="263520" y="6309360"/>
-            <a:ext cx="10785240" cy="226800"/>
+            <a:ext cx="10784880" cy="226800"/>
           </a:xfrm>
           <a:prstGeom prst="rect">
             <a:avLst/>
@@ -14886,7 +14880,7 @@
         <p:spPr>
           <a:xfrm>
             <a:off x="335520" y="764640"/>
-            <a:ext cx="10730520" cy="481320"/>
+            <a:ext cx="10730160" cy="480960"/>
           </a:xfrm>
           <a:prstGeom prst="rect">
             <a:avLst/>
@@ -14940,7 +14934,7 @@
         <p:spPr>
           <a:xfrm>
             <a:off x="335520" y="1268280"/>
-            <a:ext cx="10730520" cy="5018040"/>
+            <a:ext cx="10730160" cy="5017680"/>
           </a:xfrm>
           <a:prstGeom prst="rect">
             <a:avLst/>
@@ -15020,7 +15014,7 @@
         <p:spPr>
           <a:xfrm>
             <a:off x="432720" y="1148040"/>
-            <a:ext cx="10339560" cy="480240"/>
+            <a:ext cx="10339200" cy="479880"/>
           </a:xfrm>
           <a:prstGeom prst="rect">
             <a:avLst/>
@@ -15074,7 +15068,7 @@
         <p:spPr>
           <a:xfrm>
             <a:off x="335520" y="3291840"/>
-            <a:ext cx="10779480" cy="1356120"/>
+            <a:ext cx="10779120" cy="1355760"/>
           </a:xfrm>
           <a:prstGeom prst="roundRect">
             <a:avLst>
@@ -15130,7 +15124,7 @@
         <p:spPr>
           <a:xfrm>
             <a:off x="263520" y="6492240"/>
-            <a:ext cx="10785240" cy="226800"/>
+            <a:ext cx="10784880" cy="226800"/>
           </a:xfrm>
           <a:prstGeom prst="rect">
             <a:avLst/>
@@ -15184,7 +15178,7 @@
         <p:spPr>
           <a:xfrm>
             <a:off x="263520" y="6309360"/>
-            <a:ext cx="10785240" cy="226800"/>
+            <a:ext cx="10784880" cy="226800"/>
           </a:xfrm>
           <a:prstGeom prst="rect">
             <a:avLst/>
@@ -15250,7 +15244,7 @@
         <p:spPr>
           <a:xfrm>
             <a:off x="0" y="5140080"/>
-            <a:ext cx="11422800" cy="348480"/>
+            <a:ext cx="11422440" cy="348120"/>
           </a:xfrm>
           <a:prstGeom prst="rect">
             <a:avLst/>
@@ -15344,7 +15338,7 @@
         <p:spPr>
           <a:xfrm>
             <a:off x="335520" y="764640"/>
-            <a:ext cx="10724400" cy="475200"/>
+            <a:ext cx="10724040" cy="474840"/>
           </a:xfrm>
           <a:prstGeom prst="rect">
             <a:avLst/>
@@ -15398,7 +15392,7 @@
         <p:spPr>
           <a:xfrm>
             <a:off x="432720" y="1148040"/>
-            <a:ext cx="10333440" cy="474120"/>
+            <a:ext cx="10333080" cy="473760"/>
           </a:xfrm>
           <a:prstGeom prst="rect">
             <a:avLst/>
@@ -15452,7 +15446,7 @@
         <p:spPr>
           <a:xfrm>
             <a:off x="263520" y="6492240"/>
-            <a:ext cx="10785240" cy="226800"/>
+            <a:ext cx="10784880" cy="226800"/>
           </a:xfrm>
           <a:prstGeom prst="rect">
             <a:avLst/>
@@ -15506,7 +15500,7 @@
         <p:spPr>
           <a:xfrm>
             <a:off x="263520" y="6309360"/>
-            <a:ext cx="10785240" cy="226800"/>
+            <a:ext cx="10784880" cy="226800"/>
           </a:xfrm>
           <a:prstGeom prst="rect">
             <a:avLst/>
@@ -15602,7 +15596,7 @@
         <p:spPr>
           <a:xfrm>
             <a:off x="335520" y="764640"/>
-            <a:ext cx="10724400" cy="475200"/>
+            <a:ext cx="10724040" cy="474840"/>
           </a:xfrm>
           <a:prstGeom prst="rect">
             <a:avLst/>
@@ -15656,7 +15650,7 @@
         <p:spPr>
           <a:xfrm>
             <a:off x="335520" y="1268280"/>
-            <a:ext cx="10724400" cy="5011920"/>
+            <a:ext cx="10724040" cy="5011560"/>
           </a:xfrm>
           <a:prstGeom prst="rect">
             <a:avLst/>
@@ -15907,7 +15901,7 @@
         <p:spPr>
           <a:xfrm>
             <a:off x="432720" y="1148040"/>
-            <a:ext cx="10333440" cy="474120"/>
+            <a:ext cx="10333080" cy="473760"/>
           </a:xfrm>
           <a:prstGeom prst="rect">
             <a:avLst/>
@@ -15961,7 +15955,7 @@
         <p:spPr>
           <a:xfrm>
             <a:off x="263520" y="6492240"/>
-            <a:ext cx="10785240" cy="226800"/>
+            <a:ext cx="10784880" cy="226800"/>
           </a:xfrm>
           <a:prstGeom prst="rect">
             <a:avLst/>
@@ -16015,7 +16009,7 @@
         <p:spPr>
           <a:xfrm>
             <a:off x="263520" y="6309360"/>
-            <a:ext cx="10785240" cy="226800"/>
+            <a:ext cx="10784880" cy="226800"/>
           </a:xfrm>
           <a:prstGeom prst="rect">
             <a:avLst/>
@@ -16111,7 +16105,7 @@
         <p:spPr>
           <a:xfrm>
             <a:off x="335520" y="764640"/>
-            <a:ext cx="10728360" cy="479160"/>
+            <a:ext cx="10728000" cy="478800"/>
           </a:xfrm>
           <a:prstGeom prst="rect">
             <a:avLst/>
@@ -16165,7 +16159,7 @@
         <p:spPr>
           <a:xfrm>
             <a:off x="335520" y="1268280"/>
-            <a:ext cx="10728360" cy="5015880"/>
+            <a:ext cx="10728000" cy="5015520"/>
           </a:xfrm>
           <a:prstGeom prst="rect">
             <a:avLst/>
@@ -16389,7 +16383,7 @@
         <p:spPr>
           <a:xfrm>
             <a:off x="432720" y="1148040"/>
-            <a:ext cx="10333800" cy="474480"/>
+            <a:ext cx="10333440" cy="474120"/>
           </a:xfrm>
           <a:prstGeom prst="rect">
             <a:avLst/>
@@ -16443,7 +16437,7 @@
         <p:spPr>
           <a:xfrm>
             <a:off x="263520" y="6411600"/>
-            <a:ext cx="9786600" cy="382320"/>
+            <a:ext cx="9786240" cy="382320"/>
           </a:xfrm>
           <a:prstGeom prst="rect">
             <a:avLst/>
@@ -16572,7 +16566,7 @@
         <p:spPr>
           <a:xfrm>
             <a:off x="335520" y="764640"/>
-            <a:ext cx="10724400" cy="475200"/>
+            <a:ext cx="10724040" cy="474840"/>
           </a:xfrm>
           <a:prstGeom prst="rect">
             <a:avLst/>
@@ -16626,7 +16620,7 @@
         <p:spPr>
           <a:xfrm>
             <a:off x="335520" y="1268280"/>
-            <a:ext cx="10724400" cy="5011920"/>
+            <a:ext cx="10724040" cy="5011560"/>
           </a:xfrm>
           <a:prstGeom prst="rect">
             <a:avLst/>
@@ -16883,7 +16877,7 @@
         <p:spPr>
           <a:xfrm>
             <a:off x="432720" y="1148040"/>
-            <a:ext cx="10333440" cy="474120"/>
+            <a:ext cx="10333080" cy="473760"/>
           </a:xfrm>
           <a:prstGeom prst="rect">
             <a:avLst/>
@@ -16937,7 +16931,7 @@
         <p:spPr>
           <a:xfrm>
             <a:off x="263520" y="6492240"/>
-            <a:ext cx="10785240" cy="226800"/>
+            <a:ext cx="10784880" cy="226800"/>
           </a:xfrm>
           <a:prstGeom prst="rect">
             <a:avLst/>
@@ -16991,7 +16985,7 @@
         <p:spPr>
           <a:xfrm>
             <a:off x="263520" y="6309360"/>
-            <a:ext cx="10785240" cy="226800"/>
+            <a:ext cx="10784880" cy="226800"/>
           </a:xfrm>
           <a:prstGeom prst="rect">
             <a:avLst/>
@@ -17087,7 +17081,7 @@
         <p:spPr>
           <a:xfrm>
             <a:off x="335520" y="764640"/>
-            <a:ext cx="10724400" cy="475200"/>
+            <a:ext cx="10724040" cy="474840"/>
           </a:xfrm>
           <a:prstGeom prst="rect">
             <a:avLst/>
@@ -17141,7 +17135,7 @@
         <p:spPr>
           <a:xfrm>
             <a:off x="335520" y="1268280"/>
-            <a:ext cx="10724400" cy="5011920"/>
+            <a:ext cx="10724040" cy="5011560"/>
           </a:xfrm>
           <a:prstGeom prst="rect">
             <a:avLst/>
@@ -17404,7 +17398,7 @@
         <p:spPr>
           <a:xfrm>
             <a:off x="432720" y="1148040"/>
-            <a:ext cx="10333440" cy="474120"/>
+            <a:ext cx="10333080" cy="473760"/>
           </a:xfrm>
           <a:prstGeom prst="rect">
             <a:avLst/>
@@ -17458,7 +17452,7 @@
         <p:spPr>
           <a:xfrm>
             <a:off x="263520" y="6492240"/>
-            <a:ext cx="10785240" cy="226800"/>
+            <a:ext cx="10784880" cy="226800"/>
           </a:xfrm>
           <a:prstGeom prst="rect">
             <a:avLst/>
@@ -17512,7 +17506,7 @@
         <p:spPr>
           <a:xfrm>
             <a:off x="263520" y="6309360"/>
-            <a:ext cx="10785240" cy="226800"/>
+            <a:ext cx="10784880" cy="226800"/>
           </a:xfrm>
           <a:prstGeom prst="rect">
             <a:avLst/>
@@ -17608,7 +17602,7 @@
         <p:spPr>
           <a:xfrm>
             <a:off x="335520" y="764640"/>
-            <a:ext cx="10724400" cy="475200"/>
+            <a:ext cx="10724040" cy="474840"/>
           </a:xfrm>
           <a:prstGeom prst="rect">
             <a:avLst/>
@@ -17662,7 +17656,7 @@
         <p:spPr>
           <a:xfrm>
             <a:off x="335520" y="1268280"/>
-            <a:ext cx="10724400" cy="5011920"/>
+            <a:ext cx="10724040" cy="5011560"/>
           </a:xfrm>
           <a:prstGeom prst="rect">
             <a:avLst/>
@@ -17931,7 +17925,7 @@
         <p:spPr>
           <a:xfrm>
             <a:off x="432720" y="1148040"/>
-            <a:ext cx="10333440" cy="474120"/>
+            <a:ext cx="10333080" cy="473760"/>
           </a:xfrm>
           <a:prstGeom prst="rect">
             <a:avLst/>
@@ -17985,7 +17979,7 @@
         <p:spPr>
           <a:xfrm>
             <a:off x="263520" y="6492240"/>
-            <a:ext cx="10785240" cy="226800"/>
+            <a:ext cx="10784880" cy="226800"/>
           </a:xfrm>
           <a:prstGeom prst="rect">
             <a:avLst/>
@@ -18039,7 +18033,7 @@
         <p:spPr>
           <a:xfrm>
             <a:off x="263520" y="6309360"/>
-            <a:ext cx="10785240" cy="226800"/>
+            <a:ext cx="10784880" cy="226800"/>
           </a:xfrm>
           <a:prstGeom prst="rect">
             <a:avLst/>
@@ -18135,7 +18129,7 @@
         <p:spPr>
           <a:xfrm>
             <a:off x="335520" y="764640"/>
-            <a:ext cx="10724400" cy="475200"/>
+            <a:ext cx="10724040" cy="474840"/>
           </a:xfrm>
           <a:prstGeom prst="rect">
             <a:avLst/>
@@ -18189,7 +18183,7 @@
         <p:spPr>
           <a:xfrm>
             <a:off x="335520" y="1268280"/>
-            <a:ext cx="10724400" cy="5011920"/>
+            <a:ext cx="10724040" cy="5011560"/>
           </a:xfrm>
           <a:prstGeom prst="rect">
             <a:avLst/>
@@ -18464,7 +18458,7 @@
         <p:spPr>
           <a:xfrm>
             <a:off x="432720" y="1148040"/>
-            <a:ext cx="10333440" cy="474120"/>
+            <a:ext cx="10333080" cy="473760"/>
           </a:xfrm>
           <a:prstGeom prst="rect">
             <a:avLst/>
@@ -18518,7 +18512,7 @@
         <p:spPr>
           <a:xfrm>
             <a:off x="263520" y="6492240"/>
-            <a:ext cx="10785240" cy="226800"/>
+            <a:ext cx="10784880" cy="226800"/>
           </a:xfrm>
           <a:prstGeom prst="rect">
             <a:avLst/>
@@ -18572,7 +18566,7 @@
         <p:spPr>
           <a:xfrm>
             <a:off x="263520" y="6309360"/>
-            <a:ext cx="10785240" cy="226800"/>
+            <a:ext cx="10784880" cy="226800"/>
           </a:xfrm>
           <a:prstGeom prst="rect">
             <a:avLst/>
@@ -18668,7 +18662,7 @@
         <p:spPr>
           <a:xfrm>
             <a:off x="335520" y="764640"/>
-            <a:ext cx="10724400" cy="475200"/>
+            <a:ext cx="10724040" cy="474840"/>
           </a:xfrm>
           <a:prstGeom prst="rect">
             <a:avLst/>
@@ -18722,7 +18716,7 @@
         <p:spPr>
           <a:xfrm>
             <a:off x="432720" y="1148040"/>
-            <a:ext cx="10333440" cy="474120"/>
+            <a:ext cx="10333080" cy="473760"/>
           </a:xfrm>
           <a:prstGeom prst="rect">
             <a:avLst/>
@@ -18776,7 +18770,7 @@
         <p:spPr>
           <a:xfrm>
             <a:off x="263520" y="6492240"/>
-            <a:ext cx="10785240" cy="226800"/>
+            <a:ext cx="10784880" cy="226800"/>
           </a:xfrm>
           <a:prstGeom prst="rect">
             <a:avLst/>
@@ -18852,7 +18846,7 @@
         <p:spPr>
           <a:xfrm>
             <a:off x="263520" y="6309360"/>
-            <a:ext cx="10785240" cy="226800"/>
+            <a:ext cx="10784880" cy="226800"/>
           </a:xfrm>
           <a:prstGeom prst="rect">
             <a:avLst/>
@@ -18906,7 +18900,7 @@
         <p:spPr>
           <a:xfrm>
             <a:off x="327960" y="3165120"/>
-            <a:ext cx="10779480" cy="1356120"/>
+            <a:ext cx="10779120" cy="1355760"/>
           </a:xfrm>
           <a:prstGeom prst="roundRect">
             <a:avLst>
@@ -18962,7 +18956,7 @@
         <p:spPr>
           <a:xfrm>
             <a:off x="335520" y="1268280"/>
-            <a:ext cx="10730520" cy="5018040"/>
+            <a:ext cx="10730160" cy="5017680"/>
           </a:xfrm>
           <a:prstGeom prst="rect">
             <a:avLst/>
@@ -19069,7 +19063,7 @@
         <p:spPr>
           <a:xfrm>
             <a:off x="335520" y="764640"/>
-            <a:ext cx="10724400" cy="475200"/>
+            <a:ext cx="10724040" cy="474840"/>
           </a:xfrm>
           <a:prstGeom prst="rect">
             <a:avLst/>
@@ -19123,7 +19117,7 @@
         <p:spPr>
           <a:xfrm>
             <a:off x="432720" y="1235520"/>
-            <a:ext cx="10333440" cy="474120"/>
+            <a:ext cx="10333080" cy="473760"/>
           </a:xfrm>
           <a:prstGeom prst="rect">
             <a:avLst/>
@@ -19200,7 +19194,7 @@
         <p:spPr>
           <a:xfrm>
             <a:off x="259200" y="6424200"/>
-            <a:ext cx="11059920" cy="363960"/>
+            <a:ext cx="11059560" cy="363960"/>
           </a:xfrm>
           <a:prstGeom prst="rect">
             <a:avLst/>
@@ -19271,7 +19265,7 @@
         <p:spPr>
           <a:xfrm>
             <a:off x="620280" y="2789280"/>
-            <a:ext cx="10427040" cy="1494000"/>
+            <a:ext cx="10426680" cy="1493640"/>
           </a:xfrm>
           <a:prstGeom prst="rect">
             <a:avLst/>
@@ -19290,7 +19284,7 @@
         <p:spPr>
           <a:xfrm>
             <a:off x="5760720" y="4249800"/>
-            <a:ext cx="247680" cy="701280"/>
+            <a:ext cx="247320" cy="700920"/>
           </a:xfrm>
           <a:prstGeom prst="upArrow">
             <a:avLst>
@@ -19342,7 +19336,7 @@
         <p:spPr>
           <a:xfrm>
             <a:off x="9410040" y="4279680"/>
-            <a:ext cx="247680" cy="701280"/>
+            <a:ext cx="247320" cy="700920"/>
           </a:xfrm>
           <a:prstGeom prst="upArrow">
             <a:avLst>
@@ -19424,7 +19418,7 @@
         <p:spPr>
           <a:xfrm>
             <a:off x="335520" y="764640"/>
-            <a:ext cx="10728720" cy="479520"/>
+            <a:ext cx="10728360" cy="479160"/>
           </a:xfrm>
           <a:prstGeom prst="rect">
             <a:avLst/>
@@ -19478,7 +19472,7 @@
         <p:spPr>
           <a:xfrm>
             <a:off x="335520" y="1268280"/>
-            <a:ext cx="10728720" cy="5016240"/>
+            <a:ext cx="10728360" cy="5015880"/>
           </a:xfrm>
           <a:prstGeom prst="rect">
             <a:avLst/>
@@ -19558,7 +19552,7 @@
         <p:spPr>
           <a:xfrm>
             <a:off x="432720" y="1148040"/>
-            <a:ext cx="10334160" cy="474840"/>
+            <a:ext cx="10333800" cy="474480"/>
           </a:xfrm>
           <a:prstGeom prst="rect">
             <a:avLst/>
@@ -19612,7 +19606,7 @@
         <p:spPr>
           <a:xfrm>
             <a:off x="198000" y="3420000"/>
-            <a:ext cx="10779480" cy="998640"/>
+            <a:ext cx="10779120" cy="998280"/>
           </a:xfrm>
           <a:prstGeom prst="roundRect">
             <a:avLst>
@@ -19698,7 +19692,7 @@
         <p:spPr>
           <a:xfrm>
             <a:off x="335520" y="764640"/>
-            <a:ext cx="10724400" cy="475200"/>
+            <a:ext cx="10724040" cy="474840"/>
           </a:xfrm>
           <a:prstGeom prst="rect">
             <a:avLst/>
@@ -19752,7 +19746,7 @@
         <p:spPr>
           <a:xfrm>
             <a:off x="335520" y="1268280"/>
-            <a:ext cx="7389720" cy="5011920"/>
+            <a:ext cx="7389360" cy="5011560"/>
           </a:xfrm>
           <a:prstGeom prst="rect">
             <a:avLst/>
@@ -19906,7 +19900,7 @@
         <p:spPr>
           <a:xfrm>
             <a:off x="432720" y="1148040"/>
-            <a:ext cx="10333440" cy="474120"/>
+            <a:ext cx="10333080" cy="473760"/>
           </a:xfrm>
           <a:prstGeom prst="rect">
             <a:avLst/>
@@ -19960,7 +19954,7 @@
         <p:spPr>
           <a:xfrm>
             <a:off x="263520" y="6492240"/>
-            <a:ext cx="10785240" cy="226800"/>
+            <a:ext cx="10784880" cy="226800"/>
           </a:xfrm>
           <a:prstGeom prst="rect">
             <a:avLst/>
@@ -20014,7 +20008,7 @@
         <p:spPr>
           <a:xfrm>
             <a:off x="263520" y="6309360"/>
-            <a:ext cx="10785240" cy="226800"/>
+            <a:ext cx="10784880" cy="226800"/>
           </a:xfrm>
           <a:prstGeom prst="rect">
             <a:avLst/>
@@ -20080,7 +20074,7 @@
         <p:spPr>
           <a:xfrm>
             <a:off x="8076600" y="1268280"/>
-            <a:ext cx="3178800" cy="4955760"/>
+            <a:ext cx="3178440" cy="4955400"/>
           </a:xfrm>
           <a:prstGeom prst="rect">
             <a:avLst/>
@@ -20210,7 +20204,7 @@
         <p:spPr>
           <a:xfrm>
             <a:off x="335520" y="764640"/>
-            <a:ext cx="10724400" cy="475200"/>
+            <a:ext cx="10724040" cy="474840"/>
           </a:xfrm>
           <a:prstGeom prst="rect">
             <a:avLst/>
@@ -20264,7 +20258,7 @@
         <p:spPr>
           <a:xfrm>
             <a:off x="335520" y="1268280"/>
-            <a:ext cx="7389720" cy="5011920"/>
+            <a:ext cx="7389360" cy="5011560"/>
           </a:xfrm>
           <a:prstGeom prst="rect">
             <a:avLst/>
@@ -20492,7 +20486,7 @@
         <p:spPr>
           <a:xfrm>
             <a:off x="432720" y="1148040"/>
-            <a:ext cx="10333440" cy="474120"/>
+            <a:ext cx="10333080" cy="473760"/>
           </a:xfrm>
           <a:prstGeom prst="rect">
             <a:avLst/>
@@ -20546,7 +20540,7 @@
         <p:spPr>
           <a:xfrm>
             <a:off x="263520" y="6492240"/>
-            <a:ext cx="10785240" cy="226800"/>
+            <a:ext cx="10784880" cy="226800"/>
           </a:xfrm>
           <a:prstGeom prst="rect">
             <a:avLst/>
@@ -20600,7 +20594,7 @@
         <p:spPr>
           <a:xfrm>
             <a:off x="263520" y="6309360"/>
-            <a:ext cx="10785240" cy="226800"/>
+            <a:ext cx="10784880" cy="226800"/>
           </a:xfrm>
           <a:prstGeom prst="rect">
             <a:avLst/>
@@ -20666,7 +20660,7 @@
         <p:spPr>
           <a:xfrm>
             <a:off x="8076600" y="1268280"/>
-            <a:ext cx="3178800" cy="4955760"/>
+            <a:ext cx="3178440" cy="4955400"/>
           </a:xfrm>
           <a:prstGeom prst="rect">
             <a:avLst/>
@@ -20796,7 +20790,7 @@
         <p:spPr>
           <a:xfrm>
             <a:off x="335520" y="764640"/>
-            <a:ext cx="10724400" cy="475200"/>
+            <a:ext cx="10724040" cy="474840"/>
           </a:xfrm>
           <a:prstGeom prst="rect">
             <a:avLst/>
@@ -20850,7 +20844,7 @@
         <p:spPr>
           <a:xfrm>
             <a:off x="335520" y="1268280"/>
-            <a:ext cx="7389720" cy="5011920"/>
+            <a:ext cx="7389360" cy="5011560"/>
           </a:xfrm>
           <a:prstGeom prst="rect">
             <a:avLst/>
@@ -21078,7 +21072,7 @@
         <p:spPr>
           <a:xfrm>
             <a:off x="432720" y="1148040"/>
-            <a:ext cx="10333440" cy="474120"/>
+            <a:ext cx="10333080" cy="473760"/>
           </a:xfrm>
           <a:prstGeom prst="rect">
             <a:avLst/>
@@ -21132,7 +21126,7 @@
         <p:spPr>
           <a:xfrm>
             <a:off x="263520" y="6492240"/>
-            <a:ext cx="10785240" cy="226800"/>
+            <a:ext cx="10784880" cy="226800"/>
           </a:xfrm>
           <a:prstGeom prst="rect">
             <a:avLst/>
@@ -21186,7 +21180,7 @@
         <p:spPr>
           <a:xfrm>
             <a:off x="263520" y="6309360"/>
-            <a:ext cx="10785240" cy="226800"/>
+            <a:ext cx="10784880" cy="226800"/>
           </a:xfrm>
           <a:prstGeom prst="rect">
             <a:avLst/>
@@ -21252,7 +21246,7 @@
         <p:spPr>
           <a:xfrm>
             <a:off x="8076600" y="1268280"/>
-            <a:ext cx="3178800" cy="4955760"/>
+            <a:ext cx="3178440" cy="4955400"/>
           </a:xfrm>
           <a:prstGeom prst="rect">
             <a:avLst/>
@@ -21382,7 +21376,7 @@
         <p:spPr>
           <a:xfrm>
             <a:off x="335520" y="764640"/>
-            <a:ext cx="10728360" cy="479160"/>
+            <a:ext cx="10728000" cy="478800"/>
           </a:xfrm>
           <a:prstGeom prst="rect">
             <a:avLst/>
@@ -21436,7 +21430,7 @@
         <p:spPr>
           <a:xfrm>
             <a:off x="335520" y="1268280"/>
-            <a:ext cx="10728360" cy="5015880"/>
+            <a:ext cx="10728000" cy="5015520"/>
           </a:xfrm>
           <a:prstGeom prst="rect">
             <a:avLst/>
@@ -21748,7 +21742,7 @@
         <p:spPr>
           <a:xfrm>
             <a:off x="432720" y="1148040"/>
-            <a:ext cx="10333800" cy="474480"/>
+            <a:ext cx="10333440" cy="474120"/>
           </a:xfrm>
           <a:prstGeom prst="rect">
             <a:avLst/>
@@ -21802,7 +21796,7 @@
         <p:spPr>
           <a:xfrm>
             <a:off x="263520" y="6411600"/>
-            <a:ext cx="9786600" cy="382320"/>
+            <a:ext cx="9786240" cy="382320"/>
           </a:xfrm>
           <a:prstGeom prst="rect">
             <a:avLst/>
@@ -21931,7 +21925,7 @@
         <p:spPr>
           <a:xfrm>
             <a:off x="335520" y="764640"/>
-            <a:ext cx="10724400" cy="475200"/>
+            <a:ext cx="10724040" cy="474840"/>
           </a:xfrm>
           <a:prstGeom prst="rect">
             <a:avLst/>
@@ -21985,7 +21979,7 @@
         <p:spPr>
           <a:xfrm>
             <a:off x="335520" y="1268280"/>
-            <a:ext cx="7389720" cy="5011920"/>
+            <a:ext cx="7389360" cy="5011560"/>
           </a:xfrm>
           <a:prstGeom prst="rect">
             <a:avLst/>
@@ -22225,7 +22219,7 @@
         <p:spPr>
           <a:xfrm>
             <a:off x="432720" y="1148040"/>
-            <a:ext cx="10333440" cy="474120"/>
+            <a:ext cx="10333080" cy="473760"/>
           </a:xfrm>
           <a:prstGeom prst="rect">
             <a:avLst/>
@@ -22279,7 +22273,7 @@
         <p:spPr>
           <a:xfrm>
             <a:off x="263520" y="6492240"/>
-            <a:ext cx="10785240" cy="226800"/>
+            <a:ext cx="10784880" cy="226800"/>
           </a:xfrm>
           <a:prstGeom prst="rect">
             <a:avLst/>
@@ -22333,7 +22327,7 @@
         <p:spPr>
           <a:xfrm>
             <a:off x="263520" y="6309360"/>
-            <a:ext cx="10785240" cy="226800"/>
+            <a:ext cx="10784880" cy="226800"/>
           </a:xfrm>
           <a:prstGeom prst="rect">
             <a:avLst/>
@@ -22399,7 +22393,7 @@
         <p:spPr>
           <a:xfrm>
             <a:off x="8076600" y="1268280"/>
-            <a:ext cx="3178800" cy="4955760"/>
+            <a:ext cx="3178440" cy="4955400"/>
           </a:xfrm>
           <a:prstGeom prst="rect">
             <a:avLst/>
@@ -22529,7 +22523,7 @@
         <p:spPr>
           <a:xfrm>
             <a:off x="335520" y="764640"/>
-            <a:ext cx="10724400" cy="475200"/>
+            <a:ext cx="10724040" cy="474840"/>
           </a:xfrm>
           <a:prstGeom prst="rect">
             <a:avLst/>
@@ -22583,7 +22577,7 @@
         <p:spPr>
           <a:xfrm>
             <a:off x="335520" y="1268280"/>
-            <a:ext cx="7389720" cy="5011920"/>
+            <a:ext cx="7389360" cy="5011560"/>
           </a:xfrm>
           <a:prstGeom prst="rect">
             <a:avLst/>
@@ -22835,7 +22829,7 @@
         <p:spPr>
           <a:xfrm>
             <a:off x="432720" y="1148040"/>
-            <a:ext cx="10333440" cy="474120"/>
+            <a:ext cx="10333080" cy="473760"/>
           </a:xfrm>
           <a:prstGeom prst="rect">
             <a:avLst/>
@@ -22889,7 +22883,7 @@
         <p:spPr>
           <a:xfrm>
             <a:off x="263520" y="6492240"/>
-            <a:ext cx="10785240" cy="226800"/>
+            <a:ext cx="10784880" cy="226800"/>
           </a:xfrm>
           <a:prstGeom prst="rect">
             <a:avLst/>
@@ -22943,7 +22937,7 @@
         <p:spPr>
           <a:xfrm>
             <a:off x="263520" y="6309360"/>
-            <a:ext cx="10785240" cy="226800"/>
+            <a:ext cx="10784880" cy="226800"/>
           </a:xfrm>
           <a:prstGeom prst="rect">
             <a:avLst/>
@@ -23009,7 +23003,7 @@
         <p:spPr>
           <a:xfrm>
             <a:off x="8076600" y="1268280"/>
-            <a:ext cx="3178800" cy="4955760"/>
+            <a:ext cx="3178440" cy="4955400"/>
           </a:xfrm>
           <a:prstGeom prst="rect">
             <a:avLst/>
@@ -23139,7 +23133,7 @@
         <p:spPr>
           <a:xfrm>
             <a:off x="335520" y="764640"/>
-            <a:ext cx="10724400" cy="475200"/>
+            <a:ext cx="10724040" cy="474840"/>
           </a:xfrm>
           <a:prstGeom prst="rect">
             <a:avLst/>
@@ -23193,7 +23187,7 @@
         <p:spPr>
           <a:xfrm>
             <a:off x="335520" y="1268280"/>
-            <a:ext cx="10724400" cy="5011920"/>
+            <a:ext cx="10724040" cy="5011560"/>
           </a:xfrm>
           <a:prstGeom prst="rect">
             <a:avLst/>
@@ -23238,7 +23232,7 @@
         <p:spPr>
           <a:xfrm>
             <a:off x="432720" y="1148040"/>
-            <a:ext cx="10333440" cy="474120"/>
+            <a:ext cx="10333080" cy="473760"/>
           </a:xfrm>
           <a:prstGeom prst="rect">
             <a:avLst/>
@@ -23292,7 +23286,7 @@
         <p:spPr>
           <a:xfrm>
             <a:off x="263520" y="6492240"/>
-            <a:ext cx="10785240" cy="226800"/>
+            <a:ext cx="10784880" cy="226800"/>
           </a:xfrm>
           <a:prstGeom prst="rect">
             <a:avLst/>
@@ -23346,7 +23340,7 @@
         <p:spPr>
           <a:xfrm>
             <a:off x="263520" y="6309360"/>
-            <a:ext cx="10785240" cy="226800"/>
+            <a:ext cx="10784880" cy="226800"/>
           </a:xfrm>
           <a:prstGeom prst="rect">
             <a:avLst/>
@@ -23442,7 +23436,7 @@
         <p:spPr>
           <a:xfrm>
             <a:off x="335520" y="764640"/>
-            <a:ext cx="10724400" cy="475200"/>
+            <a:ext cx="10724040" cy="474840"/>
           </a:xfrm>
           <a:prstGeom prst="rect">
             <a:avLst/>
@@ -23496,7 +23490,7 @@
         <p:spPr>
           <a:xfrm>
             <a:off x="335520" y="1268280"/>
-            <a:ext cx="10724400" cy="5011920"/>
+            <a:ext cx="10724040" cy="5011560"/>
           </a:xfrm>
           <a:prstGeom prst="rect">
             <a:avLst/>
@@ -23588,7 +23582,7 @@
         <p:spPr>
           <a:xfrm>
             <a:off x="432720" y="1148040"/>
-            <a:ext cx="10333440" cy="474120"/>
+            <a:ext cx="10333080" cy="473760"/>
           </a:xfrm>
           <a:prstGeom prst="rect">
             <a:avLst/>
@@ -23642,7 +23636,7 @@
         <p:spPr>
           <a:xfrm>
             <a:off x="263520" y="6492240"/>
-            <a:ext cx="10785240" cy="226800"/>
+            <a:ext cx="10784880" cy="226800"/>
           </a:xfrm>
           <a:prstGeom prst="rect">
             <a:avLst/>
@@ -23696,7 +23690,7 @@
         <p:spPr>
           <a:xfrm>
             <a:off x="263520" y="6309360"/>
-            <a:ext cx="10785240" cy="226800"/>
+            <a:ext cx="10784880" cy="226800"/>
           </a:xfrm>
           <a:prstGeom prst="rect">
             <a:avLst/>
@@ -23792,7 +23786,7 @@
         <p:spPr>
           <a:xfrm>
             <a:off x="335520" y="764640"/>
-            <a:ext cx="10729440" cy="480240"/>
+            <a:ext cx="10729080" cy="479880"/>
           </a:xfrm>
           <a:prstGeom prst="rect">
             <a:avLst/>
@@ -23846,7 +23840,7 @@
         <p:spPr>
           <a:xfrm>
             <a:off x="335520" y="1268640"/>
-            <a:ext cx="10729440" cy="5016960"/>
+            <a:ext cx="10729080" cy="5016600"/>
           </a:xfrm>
           <a:prstGeom prst="rect">
             <a:avLst/>
@@ -24129,7 +24123,7 @@
         <p:spPr>
           <a:xfrm>
             <a:off x="335520" y="1268640"/>
-            <a:ext cx="10725840" cy="5013360"/>
+            <a:ext cx="10725480" cy="5013000"/>
           </a:xfrm>
           <a:prstGeom prst="rect">
             <a:avLst/>
@@ -24189,7 +24183,7 @@
         <p:spPr>
           <a:xfrm>
             <a:off x="335520" y="764640"/>
-            <a:ext cx="10725840" cy="476640"/>
+            <a:ext cx="10725480" cy="476280"/>
           </a:xfrm>
           <a:prstGeom prst="rect">
             <a:avLst/>
@@ -24264,7 +24258,7 @@
         <p:spPr>
           <a:xfrm>
             <a:off x="335520" y="764640"/>
-            <a:ext cx="10728360" cy="479160"/>
+            <a:ext cx="10728000" cy="478800"/>
           </a:xfrm>
           <a:prstGeom prst="rect">
             <a:avLst/>
@@ -24318,7 +24312,7 @@
         <p:spPr>
           <a:xfrm>
             <a:off x="335520" y="1268280"/>
-            <a:ext cx="10728360" cy="5015880"/>
+            <a:ext cx="10728000" cy="5015520"/>
           </a:xfrm>
           <a:prstGeom prst="rect">
             <a:avLst/>
@@ -24630,7 +24624,7 @@
         <p:spPr>
           <a:xfrm>
             <a:off x="432720" y="1148040"/>
-            <a:ext cx="10333800" cy="474480"/>
+            <a:ext cx="10333440" cy="474120"/>
           </a:xfrm>
           <a:prstGeom prst="rect">
             <a:avLst/>
@@ -24684,7 +24678,7 @@
         <p:spPr>
           <a:xfrm>
             <a:off x="263520" y="6411600"/>
-            <a:ext cx="9786600" cy="382320"/>
+            <a:ext cx="9786240" cy="382320"/>
           </a:xfrm>
           <a:prstGeom prst="rect">
             <a:avLst/>
@@ -24813,7 +24807,7 @@
         <p:spPr>
           <a:xfrm>
             <a:off x="335520" y="764640"/>
-            <a:ext cx="10728360" cy="479160"/>
+            <a:ext cx="10728000" cy="478800"/>
           </a:xfrm>
           <a:prstGeom prst="rect">
             <a:avLst/>
@@ -24867,7 +24861,7 @@
         <p:spPr>
           <a:xfrm>
             <a:off x="335520" y="1268280"/>
-            <a:ext cx="10728360" cy="5015880"/>
+            <a:ext cx="10728000" cy="5015520"/>
           </a:xfrm>
           <a:prstGeom prst="rect">
             <a:avLst/>
@@ -25203,7 +25197,7 @@
         <p:spPr>
           <a:xfrm>
             <a:off x="432720" y="1148040"/>
-            <a:ext cx="10333800" cy="474480"/>
+            <a:ext cx="10333440" cy="474120"/>
           </a:xfrm>
           <a:prstGeom prst="rect">
             <a:avLst/>
@@ -25257,7 +25251,7 @@
         <p:spPr>
           <a:xfrm>
             <a:off x="263520" y="6411600"/>
-            <a:ext cx="9786600" cy="382320"/>
+            <a:ext cx="9786240" cy="382320"/>
           </a:xfrm>
           <a:prstGeom prst="rect">
             <a:avLst/>
@@ -25386,7 +25380,7 @@
         <p:spPr>
           <a:xfrm>
             <a:off x="335520" y="4406760"/>
-            <a:ext cx="10724040" cy="1333080"/>
+            <a:ext cx="10723680" cy="1332720"/>
           </a:xfrm>
           <a:prstGeom prst="rect">
             <a:avLst/>
@@ -25453,7 +25447,7 @@
         <p:spPr>
           <a:xfrm>
             <a:off x="335520" y="2906640"/>
-            <a:ext cx="10724040" cy="1470960"/>
+            <a:ext cx="10723680" cy="1470600"/>
           </a:xfrm>
           <a:prstGeom prst="rect">
             <a:avLst/>
@@ -25528,7 +25522,7 @@
         <p:spPr>
           <a:xfrm>
             <a:off x="335520" y="764640"/>
-            <a:ext cx="10728720" cy="479520"/>
+            <a:ext cx="10728360" cy="479160"/>
           </a:xfrm>
           <a:prstGeom prst="rect">
             <a:avLst/>
@@ -25582,7 +25576,7 @@
         <p:spPr>
           <a:xfrm>
             <a:off x="335520" y="1268280"/>
-            <a:ext cx="10728720" cy="5016240"/>
+            <a:ext cx="10728360" cy="5015880"/>
           </a:xfrm>
           <a:prstGeom prst="rect">
             <a:avLst/>
@@ -25627,7 +25621,7 @@
         <p:spPr>
           <a:xfrm>
             <a:off x="432720" y="1148040"/>
-            <a:ext cx="10334160" cy="474840"/>
+            <a:ext cx="10333800" cy="474480"/>
           </a:xfrm>
           <a:prstGeom prst="rect">
             <a:avLst/>
@@ -25681,7 +25675,7 @@
         <p:spPr>
           <a:xfrm>
             <a:off x="263520" y="6411600"/>
-            <a:ext cx="11073960" cy="226800"/>
+            <a:ext cx="11073600" cy="226800"/>
           </a:xfrm>
           <a:prstGeom prst="rect">
             <a:avLst/>
@@ -25735,7 +25729,7 @@
         <p:spPr>
           <a:xfrm>
             <a:off x="282240" y="2340000"/>
-            <a:ext cx="10782000" cy="1178640"/>
+            <a:ext cx="10781640" cy="1178280"/>
           </a:xfrm>
           <a:prstGeom prst="roundRect">
             <a:avLst>
@@ -25791,7 +25785,7 @@
         <p:spPr>
           <a:xfrm>
             <a:off x="539280" y="2215080"/>
-            <a:ext cx="10333800" cy="875520"/>
+            <a:ext cx="10333440" cy="875160"/>
           </a:xfrm>
           <a:prstGeom prst="rect">
             <a:avLst/>

</xml_diff>

<commit_message>
* updated LTG L10 * added LTG L11 * updated LTG readme and added video links
</commit_message>
<xml_diff>
--- a/The-Limits-to-Growth/LTG-L10-Beyond-the-Circular-Economy--Part-1.pptx
+++ b/The-Limits-to-Growth/LTG-L10-Beyond-the-Circular-Economy--Part-1.pptx
@@ -1873,7 +1873,7 @@
         <p:spPr>
           <a:xfrm>
             <a:off x="11444760" y="0"/>
-            <a:ext cx="721440" cy="6830280"/>
+            <a:ext cx="720720" cy="6829560"/>
           </a:xfrm>
           <a:prstGeom prst="rect">
             <a:avLst/>
@@ -1922,7 +1922,7 @@
         <p:spPr>
           <a:xfrm>
             <a:off x="11438640" y="6453360"/>
-            <a:ext cx="738360" cy="363960"/>
+            <a:ext cx="737640" cy="363960"/>
           </a:xfrm>
           <a:prstGeom prst="rect">
             <a:avLst/>
@@ -1948,7 +1948,7 @@
                 <a:spcPct val="100000"/>
               </a:lnSpc>
             </a:pPr>
-            <a:fld id="{5383FB08-23C2-4F36-90C5-1F857250A71C}" type="slidenum">
+            <a:fld id="{730C262A-04FA-40A9-BDD8-CF47BAAC4ED3}" type="slidenum">
               <a:rPr b="0" lang="en-US" sz="1800" spc="-1" strike="noStrike">
                 <a:solidFill>
                   <a:srgbClr val="808080"/>
@@ -1976,7 +1976,7 @@
         <p:spPr>
           <a:xfrm>
             <a:off x="912240" y="1268280"/>
-            <a:ext cx="9188280" cy="341640"/>
+            <a:ext cx="9187560" cy="340920"/>
           </a:xfrm>
           <a:prstGeom prst="rect">
             <a:avLst/>
@@ -2025,7 +2025,7 @@
         <p:spPr>
           <a:xfrm>
             <a:off x="0" y="0"/>
-            <a:ext cx="3032280" cy="542160"/>
+            <a:ext cx="3031560" cy="541440"/>
           </a:xfrm>
           <a:prstGeom prst="rect">
             <a:avLst/>
@@ -2048,7 +2048,7 @@
         <p:spPr>
           <a:xfrm>
             <a:off x="7430400" y="134640"/>
-            <a:ext cx="3678120" cy="494280"/>
+            <a:ext cx="3677400" cy="493560"/>
           </a:xfrm>
           <a:prstGeom prst="rect">
             <a:avLst/>
@@ -2067,7 +2067,7 @@
         <p:spPr>
           <a:xfrm>
             <a:off x="912240" y="1268280"/>
-            <a:ext cx="9188280" cy="341640"/>
+            <a:ext cx="9187560" cy="340920"/>
           </a:xfrm>
           <a:prstGeom prst="rect">
             <a:avLst/>
@@ -2112,7 +2112,7 @@
         <p:spPr>
           <a:xfrm>
             <a:off x="11444760" y="0"/>
-            <a:ext cx="721440" cy="6830280"/>
+            <a:ext cx="720720" cy="6829560"/>
           </a:xfrm>
           <a:prstGeom prst="rect">
             <a:avLst/>
@@ -2161,7 +2161,7 @@
         <p:spPr>
           <a:xfrm>
             <a:off x="0" y="6642720"/>
-            <a:ext cx="12164400" cy="211320"/>
+            <a:ext cx="12163680" cy="211320"/>
           </a:xfrm>
           <a:prstGeom prst="rect">
             <a:avLst/>
@@ -2526,7 +2526,7 @@
         <p:spPr>
           <a:xfrm>
             <a:off x="527400" y="1412640"/>
-            <a:ext cx="10341360" cy="1127880"/>
+            <a:ext cx="10340640" cy="1127160"/>
           </a:xfrm>
           <a:prstGeom prst="rect">
             <a:avLst/>
@@ -2580,7 +2580,7 @@
         <p:spPr>
           <a:xfrm>
             <a:off x="527400" y="2852640"/>
-            <a:ext cx="10341360" cy="2348640"/>
+            <a:ext cx="10340640" cy="2347920"/>
           </a:xfrm>
           <a:prstGeom prst="rect">
             <a:avLst/>
@@ -2620,7 +2620,7 @@
                 <a:latin typeface="DejaVu Sans"/>
                 <a:ea typeface="DejaVu Sans"/>
               </a:rPr>
-              <a:t>Lecture 10: Beyond the Circular Economy</a:t>
+              <a:t>Lecture 10: Beyond the Circular Economy I</a:t>
             </a:r>
             <a:endParaRPr b="0" lang="en-GB" sz="2400" spc="-1" strike="noStrike">
               <a:solidFill>
@@ -2776,7 +2776,7 @@
         <p:spPr>
           <a:xfrm>
             <a:off x="335520" y="764640"/>
-            <a:ext cx="10728360" cy="479160"/>
+            <a:ext cx="10727640" cy="478440"/>
           </a:xfrm>
           <a:prstGeom prst="rect">
             <a:avLst/>
@@ -2830,7 +2830,7 @@
         <p:spPr>
           <a:xfrm>
             <a:off x="335520" y="1268280"/>
-            <a:ext cx="10728360" cy="5015880"/>
+            <a:ext cx="10727640" cy="5015160"/>
           </a:xfrm>
           <a:prstGeom prst="rect">
             <a:avLst/>
@@ -2952,7 +2952,7 @@
         <p:spPr>
           <a:xfrm>
             <a:off x="432720" y="1148040"/>
-            <a:ext cx="10333800" cy="474480"/>
+            <a:ext cx="10333080" cy="473760"/>
           </a:xfrm>
           <a:prstGeom prst="rect">
             <a:avLst/>
@@ -3006,7 +3006,7 @@
         <p:spPr>
           <a:xfrm>
             <a:off x="263520" y="6411600"/>
-            <a:ext cx="11073600" cy="226800"/>
+            <a:ext cx="11072880" cy="226800"/>
           </a:xfrm>
           <a:prstGeom prst="rect">
             <a:avLst/>
@@ -3060,7 +3060,7 @@
         <p:spPr>
           <a:xfrm>
             <a:off x="282240" y="2340000"/>
-            <a:ext cx="10781640" cy="1178280"/>
+            <a:ext cx="10780920" cy="1177560"/>
           </a:xfrm>
           <a:prstGeom prst="roundRect">
             <a:avLst>
@@ -3116,7 +3116,7 @@
         <p:spPr>
           <a:xfrm>
             <a:off x="539280" y="2215080"/>
-            <a:ext cx="10333440" cy="875160"/>
+            <a:ext cx="10332720" cy="874440"/>
           </a:xfrm>
           <a:prstGeom prst="rect">
             <a:avLst/>
@@ -3234,7 +3234,7 @@
         <p:spPr>
           <a:xfrm>
             <a:off x="335520" y="764640"/>
-            <a:ext cx="10728360" cy="479160"/>
+            <a:ext cx="10727640" cy="478440"/>
           </a:xfrm>
           <a:prstGeom prst="rect">
             <a:avLst/>
@@ -3288,7 +3288,7 @@
         <p:spPr>
           <a:xfrm>
             <a:off x="335520" y="1268280"/>
-            <a:ext cx="10728360" cy="5015880"/>
+            <a:ext cx="10727640" cy="5015160"/>
           </a:xfrm>
           <a:prstGeom prst="rect">
             <a:avLst/>
@@ -3400,7 +3400,7 @@
         <p:spPr>
           <a:xfrm>
             <a:off x="432720" y="1148040"/>
-            <a:ext cx="10333800" cy="474480"/>
+            <a:ext cx="10333080" cy="473760"/>
           </a:xfrm>
           <a:prstGeom prst="rect">
             <a:avLst/>
@@ -3454,7 +3454,7 @@
         <p:spPr>
           <a:xfrm>
             <a:off x="263520" y="6411600"/>
-            <a:ext cx="11073600" cy="226800"/>
+            <a:ext cx="11072880" cy="226800"/>
           </a:xfrm>
           <a:prstGeom prst="rect">
             <a:avLst/>
@@ -3508,7 +3508,7 @@
         <p:spPr>
           <a:xfrm>
             <a:off x="282240" y="2340000"/>
-            <a:ext cx="10781640" cy="1178280"/>
+            <a:ext cx="10780920" cy="1177560"/>
           </a:xfrm>
           <a:prstGeom prst="roundRect">
             <a:avLst>
@@ -3564,7 +3564,7 @@
         <p:spPr>
           <a:xfrm>
             <a:off x="539280" y="2215080"/>
-            <a:ext cx="10333440" cy="875160"/>
+            <a:ext cx="10332720" cy="874440"/>
           </a:xfrm>
           <a:prstGeom prst="rect">
             <a:avLst/>
@@ -3682,7 +3682,7 @@
         <p:spPr>
           <a:xfrm>
             <a:off x="335520" y="764640"/>
-            <a:ext cx="10728360" cy="479160"/>
+            <a:ext cx="10727640" cy="478440"/>
           </a:xfrm>
           <a:prstGeom prst="rect">
             <a:avLst/>
@@ -3736,7 +3736,7 @@
         <p:spPr>
           <a:xfrm>
             <a:off x="335520" y="1268280"/>
-            <a:ext cx="10728360" cy="5015880"/>
+            <a:ext cx="10727640" cy="5015160"/>
           </a:xfrm>
           <a:prstGeom prst="rect">
             <a:avLst/>
@@ -3832,7 +3832,7 @@
         <p:spPr>
           <a:xfrm>
             <a:off x="432720" y="1148040"/>
-            <a:ext cx="10333800" cy="474480"/>
+            <a:ext cx="10333080" cy="473760"/>
           </a:xfrm>
           <a:prstGeom prst="rect">
             <a:avLst/>
@@ -3886,7 +3886,7 @@
         <p:spPr>
           <a:xfrm>
             <a:off x="263520" y="6411600"/>
-            <a:ext cx="11073600" cy="226800"/>
+            <a:ext cx="11072880" cy="226800"/>
           </a:xfrm>
           <a:prstGeom prst="rect">
             <a:avLst/>
@@ -3940,7 +3940,7 @@
         <p:spPr>
           <a:xfrm>
             <a:off x="282240" y="2160000"/>
-            <a:ext cx="10781640" cy="1358280"/>
+            <a:ext cx="10780920" cy="1357560"/>
           </a:xfrm>
           <a:prstGeom prst="roundRect">
             <a:avLst>
@@ -3996,7 +3996,7 @@
         <p:spPr>
           <a:xfrm>
             <a:off x="540000" y="1980000"/>
-            <a:ext cx="10333440" cy="1110240"/>
+            <a:ext cx="10332720" cy="1109520"/>
           </a:xfrm>
           <a:prstGeom prst="rect">
             <a:avLst/>
@@ -4114,7 +4114,7 @@
         <p:spPr>
           <a:xfrm>
             <a:off x="335520" y="764640"/>
-            <a:ext cx="10728360" cy="479160"/>
+            <a:ext cx="10727640" cy="478440"/>
           </a:xfrm>
           <a:prstGeom prst="rect">
             <a:avLst/>
@@ -4168,7 +4168,7 @@
         <p:spPr>
           <a:xfrm>
             <a:off x="335520" y="1268280"/>
-            <a:ext cx="10728360" cy="5015880"/>
+            <a:ext cx="10727640" cy="5015160"/>
           </a:xfrm>
           <a:prstGeom prst="rect">
             <a:avLst/>
@@ -4290,7 +4290,7 @@
         <p:spPr>
           <a:xfrm>
             <a:off x="432720" y="1148040"/>
-            <a:ext cx="10333800" cy="474480"/>
+            <a:ext cx="10333080" cy="473760"/>
           </a:xfrm>
           <a:prstGeom prst="rect">
             <a:avLst/>
@@ -4344,7 +4344,7 @@
         <p:spPr>
           <a:xfrm>
             <a:off x="263520" y="6411600"/>
-            <a:ext cx="11073600" cy="226800"/>
+            <a:ext cx="11072880" cy="226800"/>
           </a:xfrm>
           <a:prstGeom prst="rect">
             <a:avLst/>
@@ -4398,7 +4398,7 @@
         <p:spPr>
           <a:xfrm>
             <a:off x="282240" y="2160000"/>
-            <a:ext cx="10781640" cy="1358280"/>
+            <a:ext cx="10780920" cy="1357560"/>
           </a:xfrm>
           <a:prstGeom prst="roundRect">
             <a:avLst>
@@ -4454,7 +4454,7 @@
         <p:spPr>
           <a:xfrm>
             <a:off x="540000" y="1980000"/>
-            <a:ext cx="10333440" cy="1110240"/>
+            <a:ext cx="10332720" cy="1109520"/>
           </a:xfrm>
           <a:prstGeom prst="rect">
             <a:avLst/>
@@ -4572,7 +4572,7 @@
         <p:spPr>
           <a:xfrm>
             <a:off x="335520" y="764640"/>
-            <a:ext cx="10728360" cy="479160"/>
+            <a:ext cx="10727640" cy="478440"/>
           </a:xfrm>
           <a:prstGeom prst="rect">
             <a:avLst/>
@@ -4626,7 +4626,7 @@
         <p:spPr>
           <a:xfrm>
             <a:off x="335520" y="1268280"/>
-            <a:ext cx="10728360" cy="5015880"/>
+            <a:ext cx="10727640" cy="5015160"/>
           </a:xfrm>
           <a:prstGeom prst="rect">
             <a:avLst/>
@@ -4738,7 +4738,7 @@
         <p:spPr>
           <a:xfrm>
             <a:off x="432720" y="1148040"/>
-            <a:ext cx="10333800" cy="474480"/>
+            <a:ext cx="10333080" cy="473760"/>
           </a:xfrm>
           <a:prstGeom prst="rect">
             <a:avLst/>
@@ -4792,7 +4792,7 @@
         <p:spPr>
           <a:xfrm>
             <a:off x="263520" y="6411600"/>
-            <a:ext cx="11073600" cy="226800"/>
+            <a:ext cx="11072880" cy="226800"/>
           </a:xfrm>
           <a:prstGeom prst="rect">
             <a:avLst/>
@@ -4846,7 +4846,7 @@
         <p:spPr>
           <a:xfrm>
             <a:off x="282240" y="2160000"/>
-            <a:ext cx="10781640" cy="1358280"/>
+            <a:ext cx="10780920" cy="1357560"/>
           </a:xfrm>
           <a:prstGeom prst="roundRect">
             <a:avLst>
@@ -4902,7 +4902,7 @@
         <p:spPr>
           <a:xfrm>
             <a:off x="540000" y="1980000"/>
-            <a:ext cx="10333440" cy="1110240"/>
+            <a:ext cx="10332720" cy="1109520"/>
           </a:xfrm>
           <a:prstGeom prst="rect">
             <a:avLst/>
@@ -5020,7 +5020,7 @@
         <p:spPr>
           <a:xfrm>
             <a:off x="335520" y="764640"/>
-            <a:ext cx="10728360" cy="479160"/>
+            <a:ext cx="10727640" cy="478440"/>
           </a:xfrm>
           <a:prstGeom prst="rect">
             <a:avLst/>
@@ -5074,7 +5074,7 @@
         <p:spPr>
           <a:xfrm>
             <a:off x="335520" y="1268280"/>
-            <a:ext cx="10728360" cy="5015880"/>
+            <a:ext cx="10727640" cy="5015160"/>
           </a:xfrm>
           <a:prstGeom prst="rect">
             <a:avLst/>
@@ -5224,7 +5224,7 @@
         <p:spPr>
           <a:xfrm>
             <a:off x="432720" y="1148040"/>
-            <a:ext cx="10333800" cy="474480"/>
+            <a:ext cx="10333080" cy="473760"/>
           </a:xfrm>
           <a:prstGeom prst="rect">
             <a:avLst/>
@@ -5278,7 +5278,7 @@
         <p:spPr>
           <a:xfrm>
             <a:off x="263520" y="6411600"/>
-            <a:ext cx="11073600" cy="226800"/>
+            <a:ext cx="11072880" cy="226800"/>
           </a:xfrm>
           <a:prstGeom prst="rect">
             <a:avLst/>
@@ -5362,7 +5362,7 @@
         <p:spPr>
           <a:xfrm>
             <a:off x="335520" y="764640"/>
-            <a:ext cx="10728360" cy="479160"/>
+            <a:ext cx="10727640" cy="478440"/>
           </a:xfrm>
           <a:prstGeom prst="rect">
             <a:avLst/>
@@ -5416,7 +5416,7 @@
         <p:spPr>
           <a:xfrm>
             <a:off x="335520" y="1268280"/>
-            <a:ext cx="10728360" cy="5015880"/>
+            <a:ext cx="10727640" cy="5015160"/>
           </a:xfrm>
           <a:prstGeom prst="rect">
             <a:avLst/>
@@ -5461,7 +5461,7 @@
         <p:spPr>
           <a:xfrm>
             <a:off x="432720" y="1148040"/>
-            <a:ext cx="10333800" cy="474480"/>
+            <a:ext cx="10333080" cy="473760"/>
           </a:xfrm>
           <a:prstGeom prst="rect">
             <a:avLst/>
@@ -5515,7 +5515,7 @@
         <p:spPr>
           <a:xfrm>
             <a:off x="264600" y="6300000"/>
-            <a:ext cx="11073600" cy="362160"/>
+            <a:ext cx="11072880" cy="361440"/>
           </a:xfrm>
           <a:prstGeom prst="rect">
             <a:avLst/>
@@ -5572,7 +5572,7 @@
         <p:spPr>
           <a:xfrm>
             <a:off x="284400" y="2078640"/>
-            <a:ext cx="11053800" cy="998280"/>
+            <a:ext cx="11053080" cy="997560"/>
           </a:xfrm>
           <a:prstGeom prst="roundRect">
             <a:avLst>
@@ -5658,7 +5658,7 @@
         <p:spPr>
           <a:xfrm>
             <a:off x="335520" y="764640"/>
-            <a:ext cx="10728360" cy="479160"/>
+            <a:ext cx="10727640" cy="478440"/>
           </a:xfrm>
           <a:prstGeom prst="rect">
             <a:avLst/>
@@ -5712,7 +5712,7 @@
         <p:spPr>
           <a:xfrm>
             <a:off x="335520" y="1268280"/>
-            <a:ext cx="10728360" cy="5015880"/>
+            <a:ext cx="10727640" cy="5015160"/>
           </a:xfrm>
           <a:prstGeom prst="rect">
             <a:avLst/>
@@ -5757,7 +5757,7 @@
         <p:spPr>
           <a:xfrm>
             <a:off x="432720" y="1148040"/>
-            <a:ext cx="10333800" cy="474480"/>
+            <a:ext cx="10333080" cy="473760"/>
           </a:xfrm>
           <a:prstGeom prst="rect">
             <a:avLst/>
@@ -5811,7 +5811,7 @@
         <p:spPr>
           <a:xfrm>
             <a:off x="264600" y="6300000"/>
-            <a:ext cx="11073600" cy="363960"/>
+            <a:ext cx="11072880" cy="363960"/>
           </a:xfrm>
           <a:prstGeom prst="rect">
             <a:avLst/>
@@ -5878,7 +5878,7 @@
         <p:spPr>
           <a:xfrm>
             <a:off x="284400" y="2078640"/>
-            <a:ext cx="11053800" cy="998280"/>
+            <a:ext cx="11053080" cy="997560"/>
           </a:xfrm>
           <a:prstGeom prst="roundRect">
             <a:avLst>
@@ -5934,7 +5934,7 @@
         <p:spPr>
           <a:xfrm>
             <a:off x="540000" y="2078640"/>
-            <a:ext cx="10618200" cy="884520"/>
+            <a:ext cx="10617480" cy="883800"/>
           </a:xfrm>
           <a:prstGeom prst="rect">
             <a:avLst/>
@@ -6038,7 +6038,7 @@
         <p:spPr>
           <a:xfrm>
             <a:off x="335520" y="764640"/>
-            <a:ext cx="10728360" cy="479160"/>
+            <a:ext cx="10727640" cy="478440"/>
           </a:xfrm>
           <a:prstGeom prst="rect">
             <a:avLst/>
@@ -6092,7 +6092,7 @@
         <p:spPr>
           <a:xfrm>
             <a:off x="335520" y="1268280"/>
-            <a:ext cx="10728360" cy="5015880"/>
+            <a:ext cx="10727640" cy="5015160"/>
           </a:xfrm>
           <a:prstGeom prst="rect">
             <a:avLst/>
@@ -6137,7 +6137,7 @@
         <p:spPr>
           <a:xfrm>
             <a:off x="432720" y="1148040"/>
-            <a:ext cx="10333800" cy="474480"/>
+            <a:ext cx="10333080" cy="473760"/>
           </a:xfrm>
           <a:prstGeom prst="rect">
             <a:avLst/>
@@ -6191,7 +6191,7 @@
         <p:spPr>
           <a:xfrm>
             <a:off x="264600" y="6300000"/>
-            <a:ext cx="11073600" cy="363960"/>
+            <a:ext cx="11072880" cy="363960"/>
           </a:xfrm>
           <a:prstGeom prst="rect">
             <a:avLst/>
@@ -6268,7 +6268,7 @@
         <p:spPr>
           <a:xfrm>
             <a:off x="284400" y="2078640"/>
-            <a:ext cx="11053800" cy="998280"/>
+            <a:ext cx="11053080" cy="997560"/>
           </a:xfrm>
           <a:prstGeom prst="roundRect">
             <a:avLst>
@@ -6324,7 +6324,7 @@
         <p:spPr>
           <a:xfrm>
             <a:off x="540000" y="2078640"/>
-            <a:ext cx="10618200" cy="884520"/>
+            <a:ext cx="10617480" cy="883800"/>
           </a:xfrm>
           <a:prstGeom prst="rect">
             <a:avLst/>
@@ -6398,7 +6398,7 @@
         <p:spPr>
           <a:xfrm>
             <a:off x="360000" y="3780000"/>
-            <a:ext cx="10618200" cy="898200"/>
+            <a:ext cx="10617480" cy="897480"/>
           </a:xfrm>
           <a:prstGeom prst="rect">
             <a:avLst/>
@@ -6472,7 +6472,7 @@
         <p:spPr>
           <a:xfrm>
             <a:off x="284400" y="3679920"/>
-            <a:ext cx="11053800" cy="1178280"/>
+            <a:ext cx="11053080" cy="1177560"/>
           </a:xfrm>
           <a:prstGeom prst="roundRect">
             <a:avLst>
@@ -6558,7 +6558,7 @@
         <p:spPr>
           <a:xfrm>
             <a:off x="335520" y="764640"/>
-            <a:ext cx="10728360" cy="479160"/>
+            <a:ext cx="10727640" cy="478440"/>
           </a:xfrm>
           <a:prstGeom prst="rect">
             <a:avLst/>
@@ -6612,7 +6612,7 @@
         <p:spPr>
           <a:xfrm>
             <a:off x="335520" y="1268280"/>
-            <a:ext cx="10728360" cy="5015880"/>
+            <a:ext cx="10727640" cy="5015160"/>
           </a:xfrm>
           <a:prstGeom prst="rect">
             <a:avLst/>
@@ -6657,7 +6657,7 @@
         <p:spPr>
           <a:xfrm>
             <a:off x="432720" y="1148040"/>
-            <a:ext cx="10333800" cy="474480"/>
+            <a:ext cx="10333080" cy="473760"/>
           </a:xfrm>
           <a:prstGeom prst="rect">
             <a:avLst/>
@@ -6711,7 +6711,7 @@
         <p:spPr>
           <a:xfrm>
             <a:off x="264600" y="6300000"/>
-            <a:ext cx="11073600" cy="363960"/>
+            <a:ext cx="11072880" cy="363960"/>
           </a:xfrm>
           <a:prstGeom prst="rect">
             <a:avLst/>
@@ -6788,7 +6788,7 @@
         <p:spPr>
           <a:xfrm>
             <a:off x="284400" y="2078640"/>
-            <a:ext cx="11053800" cy="998280"/>
+            <a:ext cx="11053080" cy="997560"/>
           </a:xfrm>
           <a:prstGeom prst="roundRect">
             <a:avLst>
@@ -6844,7 +6844,7 @@
         <p:spPr>
           <a:xfrm>
             <a:off x="540000" y="2078640"/>
-            <a:ext cx="10618200" cy="884520"/>
+            <a:ext cx="10617480" cy="883800"/>
           </a:xfrm>
           <a:prstGeom prst="rect">
             <a:avLst/>
@@ -6918,7 +6918,7 @@
         <p:spPr>
           <a:xfrm>
             <a:off x="360000" y="3780000"/>
-            <a:ext cx="10618200" cy="898200"/>
+            <a:ext cx="10617480" cy="897480"/>
           </a:xfrm>
           <a:prstGeom prst="rect">
             <a:avLst/>
@@ -6992,7 +6992,7 @@
         <p:spPr>
           <a:xfrm>
             <a:off x="284400" y="3679920"/>
-            <a:ext cx="11053800" cy="1178280"/>
+            <a:ext cx="11053080" cy="1177560"/>
           </a:xfrm>
           <a:prstGeom prst="roundRect">
             <a:avLst>
@@ -7048,7 +7048,7 @@
         <p:spPr>
           <a:xfrm>
             <a:off x="3500640" y="5400000"/>
-            <a:ext cx="4957560" cy="619200"/>
+            <a:ext cx="4956840" cy="618480"/>
           </a:xfrm>
           <a:prstGeom prst="rect">
             <a:avLst/>
@@ -7152,7 +7152,7 @@
         <p:spPr>
           <a:xfrm>
             <a:off x="335520" y="764640"/>
-            <a:ext cx="10725480" cy="476280"/>
+            <a:ext cx="10724760" cy="475560"/>
           </a:xfrm>
           <a:prstGeom prst="rect">
             <a:avLst/>
@@ -7206,7 +7206,7 @@
         <p:spPr>
           <a:xfrm>
             <a:off x="335520" y="1268280"/>
-            <a:ext cx="10725480" cy="5013000"/>
+            <a:ext cx="10724760" cy="5012280"/>
           </a:xfrm>
           <a:prstGeom prst="rect">
             <a:avLst/>
@@ -7440,7 +7440,7 @@
         <p:spPr>
           <a:xfrm>
             <a:off x="335520" y="764640"/>
-            <a:ext cx="10728360" cy="479160"/>
+            <a:ext cx="10727640" cy="478440"/>
           </a:xfrm>
           <a:prstGeom prst="rect">
             <a:avLst/>
@@ -7494,7 +7494,7 @@
         <p:spPr>
           <a:xfrm>
             <a:off x="335520" y="1268280"/>
-            <a:ext cx="10728360" cy="5015880"/>
+            <a:ext cx="10727640" cy="5015160"/>
           </a:xfrm>
           <a:prstGeom prst="rect">
             <a:avLst/>
@@ -7809,7 +7809,7 @@
         <p:spPr>
           <a:xfrm>
             <a:off x="432720" y="1148040"/>
-            <a:ext cx="10333800" cy="474480"/>
+            <a:ext cx="10333080" cy="473760"/>
           </a:xfrm>
           <a:prstGeom prst="rect">
             <a:avLst/>
@@ -7873,7 +7873,7 @@
         <p:spPr>
           <a:xfrm>
             <a:off x="263520" y="6411600"/>
-            <a:ext cx="11073600" cy="226800"/>
+            <a:ext cx="11072880" cy="226800"/>
           </a:xfrm>
           <a:prstGeom prst="rect">
             <a:avLst/>
@@ -7957,7 +7957,7 @@
         <p:spPr>
           <a:xfrm>
             <a:off x="335520" y="764640"/>
-            <a:ext cx="10728360" cy="479160"/>
+            <a:ext cx="10727640" cy="478440"/>
           </a:xfrm>
           <a:prstGeom prst="rect">
             <a:avLst/>
@@ -8011,7 +8011,7 @@
         <p:spPr>
           <a:xfrm>
             <a:off x="335520" y="1268280"/>
-            <a:ext cx="10728360" cy="5015880"/>
+            <a:ext cx="10727640" cy="5015160"/>
           </a:xfrm>
           <a:prstGeom prst="rect">
             <a:avLst/>
@@ -8332,7 +8332,7 @@
         <p:spPr>
           <a:xfrm>
             <a:off x="432720" y="1148040"/>
-            <a:ext cx="10333800" cy="474480"/>
+            <a:ext cx="10333080" cy="473760"/>
           </a:xfrm>
           <a:prstGeom prst="rect">
             <a:avLst/>
@@ -8396,7 +8396,7 @@
         <p:spPr>
           <a:xfrm>
             <a:off x="263520" y="6411600"/>
-            <a:ext cx="11073600" cy="226800"/>
+            <a:ext cx="11072880" cy="226800"/>
           </a:xfrm>
           <a:prstGeom prst="rect">
             <a:avLst/>
@@ -8480,7 +8480,7 @@
         <p:spPr>
           <a:xfrm>
             <a:off x="335520" y="764640"/>
-            <a:ext cx="10728360" cy="479160"/>
+            <a:ext cx="10727640" cy="478440"/>
           </a:xfrm>
           <a:prstGeom prst="rect">
             <a:avLst/>
@@ -8534,7 +8534,7 @@
         <p:spPr>
           <a:xfrm>
             <a:off x="335520" y="1268280"/>
-            <a:ext cx="10728360" cy="5015880"/>
+            <a:ext cx="10727640" cy="5015160"/>
           </a:xfrm>
           <a:prstGeom prst="rect">
             <a:avLst/>
@@ -8855,7 +8855,7 @@
         <p:spPr>
           <a:xfrm>
             <a:off x="432720" y="1148040"/>
-            <a:ext cx="10333800" cy="474480"/>
+            <a:ext cx="10333080" cy="473760"/>
           </a:xfrm>
           <a:prstGeom prst="rect">
             <a:avLst/>
@@ -8919,7 +8919,7 @@
         <p:spPr>
           <a:xfrm>
             <a:off x="263520" y="6411600"/>
-            <a:ext cx="11073600" cy="226800"/>
+            <a:ext cx="11072880" cy="226800"/>
           </a:xfrm>
           <a:prstGeom prst="rect">
             <a:avLst/>
@@ -9003,7 +9003,7 @@
         <p:spPr>
           <a:xfrm>
             <a:off x="335520" y="764640"/>
-            <a:ext cx="10728360" cy="479160"/>
+            <a:ext cx="10727640" cy="478440"/>
           </a:xfrm>
           <a:prstGeom prst="rect">
             <a:avLst/>
@@ -9057,7 +9057,7 @@
         <p:spPr>
           <a:xfrm>
             <a:off x="335520" y="1268280"/>
-            <a:ext cx="10728360" cy="5015880"/>
+            <a:ext cx="10727640" cy="5015160"/>
           </a:xfrm>
           <a:prstGeom prst="rect">
             <a:avLst/>
@@ -9384,7 +9384,7 @@
         <p:spPr>
           <a:xfrm>
             <a:off x="432720" y="1148040"/>
-            <a:ext cx="10333800" cy="474480"/>
+            <a:ext cx="10333080" cy="473760"/>
           </a:xfrm>
           <a:prstGeom prst="rect">
             <a:avLst/>
@@ -9448,7 +9448,7 @@
         <p:spPr>
           <a:xfrm>
             <a:off x="263520" y="6411600"/>
-            <a:ext cx="11073600" cy="226800"/>
+            <a:ext cx="11072880" cy="226800"/>
           </a:xfrm>
           <a:prstGeom prst="rect">
             <a:avLst/>
@@ -9532,7 +9532,7 @@
         <p:spPr>
           <a:xfrm>
             <a:off x="335520" y="764640"/>
-            <a:ext cx="10728360" cy="479160"/>
+            <a:ext cx="10727640" cy="478440"/>
           </a:xfrm>
           <a:prstGeom prst="rect">
             <a:avLst/>
@@ -9586,7 +9586,7 @@
         <p:spPr>
           <a:xfrm>
             <a:off x="335520" y="1268280"/>
-            <a:ext cx="10728360" cy="5015880"/>
+            <a:ext cx="10727640" cy="5015160"/>
           </a:xfrm>
           <a:prstGeom prst="rect">
             <a:avLst/>
@@ -9855,7 +9855,7 @@
         <p:spPr>
           <a:xfrm>
             <a:off x="432720" y="1148040"/>
-            <a:ext cx="10333800" cy="474480"/>
+            <a:ext cx="10333080" cy="473760"/>
           </a:xfrm>
           <a:prstGeom prst="rect">
             <a:avLst/>
@@ -9919,7 +9919,7 @@
         <p:spPr>
           <a:xfrm>
             <a:off x="263520" y="6411600"/>
-            <a:ext cx="11073600" cy="226800"/>
+            <a:ext cx="11072880" cy="226800"/>
           </a:xfrm>
           <a:prstGeom prst="rect">
             <a:avLst/>
@@ -10003,7 +10003,7 @@
         <p:spPr>
           <a:xfrm>
             <a:off x="335520" y="764640"/>
-            <a:ext cx="10728360" cy="479160"/>
+            <a:ext cx="10727640" cy="478440"/>
           </a:xfrm>
           <a:prstGeom prst="rect">
             <a:avLst/>
@@ -10057,7 +10057,7 @@
         <p:spPr>
           <a:xfrm>
             <a:off x="335520" y="1268280"/>
-            <a:ext cx="10728360" cy="5015880"/>
+            <a:ext cx="10727640" cy="5015160"/>
           </a:xfrm>
           <a:prstGeom prst="rect">
             <a:avLst/>
@@ -10320,7 +10320,7 @@
         <p:spPr>
           <a:xfrm>
             <a:off x="432720" y="1148040"/>
-            <a:ext cx="10333800" cy="474480"/>
+            <a:ext cx="10333080" cy="473760"/>
           </a:xfrm>
           <a:prstGeom prst="rect">
             <a:avLst/>
@@ -10384,7 +10384,7 @@
         <p:spPr>
           <a:xfrm>
             <a:off x="263520" y="6411600"/>
-            <a:ext cx="11073600" cy="226800"/>
+            <a:ext cx="11072880" cy="226800"/>
           </a:xfrm>
           <a:prstGeom prst="rect">
             <a:avLst/>
@@ -10468,7 +10468,7 @@
         <p:spPr>
           <a:xfrm>
             <a:off x="335520" y="764640"/>
-            <a:ext cx="10728360" cy="479160"/>
+            <a:ext cx="10727640" cy="478440"/>
           </a:xfrm>
           <a:prstGeom prst="rect">
             <a:avLst/>
@@ -10522,7 +10522,7 @@
         <p:spPr>
           <a:xfrm>
             <a:off x="335520" y="1268280"/>
-            <a:ext cx="10728360" cy="5015880"/>
+            <a:ext cx="10727640" cy="5015160"/>
           </a:xfrm>
           <a:prstGeom prst="rect">
             <a:avLst/>
@@ -10567,7 +10567,7 @@
         <p:spPr>
           <a:xfrm>
             <a:off x="432720" y="1148040"/>
-            <a:ext cx="10333800" cy="474480"/>
+            <a:ext cx="10333080" cy="473760"/>
           </a:xfrm>
           <a:prstGeom prst="rect">
             <a:avLst/>
@@ -10621,7 +10621,7 @@
         <p:spPr>
           <a:xfrm>
             <a:off x="263520" y="6411600"/>
-            <a:ext cx="11073600" cy="226800"/>
+            <a:ext cx="11072880" cy="226800"/>
           </a:xfrm>
           <a:prstGeom prst="rect">
             <a:avLst/>
@@ -10679,7 +10679,7 @@
         <p:spPr>
           <a:xfrm>
             <a:off x="2231280" y="1833480"/>
-            <a:ext cx="6292440" cy="3420000"/>
+            <a:ext cx="6291720" cy="3419280"/>
           </a:xfrm>
           <a:prstGeom prst="rect">
             <a:avLst/>
@@ -10698,7 +10698,7 @@
         <p:spPr>
           <a:xfrm>
             <a:off x="1620000" y="5511600"/>
-            <a:ext cx="1619280" cy="772560"/>
+            <a:ext cx="1618560" cy="771840"/>
           </a:xfrm>
           <a:prstGeom prst="wedgeRectCallout">
             <a:avLst>
@@ -10785,7 +10785,7 @@
         <p:spPr>
           <a:xfrm>
             <a:off x="3600000" y="5511600"/>
-            <a:ext cx="1439280" cy="772560"/>
+            <a:ext cx="1438560" cy="771840"/>
           </a:xfrm>
           <a:prstGeom prst="wedgeRectCallout">
             <a:avLst>
@@ -10872,7 +10872,7 @@
         <p:spPr>
           <a:xfrm>
             <a:off x="5400000" y="5580000"/>
-            <a:ext cx="2879280" cy="704160"/>
+            <a:ext cx="2878560" cy="703440"/>
           </a:xfrm>
           <a:prstGeom prst="wedgeRectCallout">
             <a:avLst>
@@ -11012,7 +11012,7 @@
         <p:spPr>
           <a:xfrm>
             <a:off x="335520" y="4406760"/>
-            <a:ext cx="10723680" cy="1332720"/>
+            <a:ext cx="10722960" cy="1332000"/>
           </a:xfrm>
           <a:prstGeom prst="rect">
             <a:avLst/>
@@ -11066,7 +11066,7 @@
         <p:spPr>
           <a:xfrm>
             <a:off x="335520" y="2906640"/>
-            <a:ext cx="10723680" cy="1470600"/>
+            <a:ext cx="10722960" cy="1469880"/>
           </a:xfrm>
           <a:prstGeom prst="rect">
             <a:avLst/>
@@ -11141,7 +11141,7 @@
         <p:spPr>
           <a:xfrm>
             <a:off x="335520" y="764640"/>
-            <a:ext cx="10733040" cy="483840"/>
+            <a:ext cx="10732320" cy="483120"/>
           </a:xfrm>
           <a:prstGeom prst="rect">
             <a:avLst/>
@@ -11195,7 +11195,7 @@
         <p:spPr>
           <a:xfrm>
             <a:off x="335520" y="1244520"/>
-            <a:ext cx="10733040" cy="4332600"/>
+            <a:ext cx="10732320" cy="4331880"/>
           </a:xfrm>
           <a:prstGeom prst="rect">
             <a:avLst/>
@@ -11272,7 +11272,7 @@
         <p:spPr>
           <a:xfrm>
             <a:off x="432720" y="1148040"/>
-            <a:ext cx="10342080" cy="482760"/>
+            <a:ext cx="10341360" cy="482040"/>
           </a:xfrm>
           <a:prstGeom prst="rect">
             <a:avLst/>
@@ -11326,7 +11326,7 @@
         <p:spPr>
           <a:xfrm>
             <a:off x="335520" y="2778480"/>
-            <a:ext cx="10782000" cy="1358640"/>
+            <a:ext cx="10781280" cy="1357920"/>
           </a:xfrm>
           <a:prstGeom prst="roundRect">
             <a:avLst>
@@ -11382,7 +11382,7 @@
         <p:spPr>
           <a:xfrm>
             <a:off x="335520" y="1268280"/>
-            <a:ext cx="10728360" cy="5015880"/>
+            <a:ext cx="10727640" cy="5015160"/>
           </a:xfrm>
           <a:prstGeom prst="rect">
             <a:avLst/>
@@ -11698,7 +11698,7 @@
         <p:spPr>
           <a:xfrm>
             <a:off x="335520" y="764640"/>
-            <a:ext cx="10733040" cy="483840"/>
+            <a:ext cx="10732320" cy="483120"/>
           </a:xfrm>
           <a:prstGeom prst="rect">
             <a:avLst/>
@@ -11752,7 +11752,7 @@
         <p:spPr>
           <a:xfrm>
             <a:off x="335520" y="1244520"/>
-            <a:ext cx="10733040" cy="4332600"/>
+            <a:ext cx="10732320" cy="4331880"/>
           </a:xfrm>
           <a:prstGeom prst="rect">
             <a:avLst/>
@@ -11829,7 +11829,7 @@
         <p:spPr>
           <a:xfrm>
             <a:off x="432720" y="1148040"/>
-            <a:ext cx="10342080" cy="482760"/>
+            <a:ext cx="10341360" cy="482040"/>
           </a:xfrm>
           <a:prstGeom prst="rect">
             <a:avLst/>
@@ -11883,7 +11883,7 @@
         <p:spPr>
           <a:xfrm>
             <a:off x="335520" y="2778480"/>
-            <a:ext cx="10782000" cy="1358640"/>
+            <a:ext cx="10781280" cy="1357920"/>
           </a:xfrm>
           <a:prstGeom prst="roundRect">
             <a:avLst>
@@ -11939,7 +11939,7 @@
         <p:spPr>
           <a:xfrm>
             <a:off x="335520" y="1268280"/>
-            <a:ext cx="10728360" cy="5015880"/>
+            <a:ext cx="10727640" cy="5015160"/>
           </a:xfrm>
           <a:prstGeom prst="rect">
             <a:avLst/>
@@ -12261,7 +12261,7 @@
         <p:spPr>
           <a:xfrm>
             <a:off x="335520" y="4406760"/>
-            <a:ext cx="10723680" cy="1332720"/>
+            <a:ext cx="10722960" cy="1332000"/>
           </a:xfrm>
           <a:prstGeom prst="rect">
             <a:avLst/>
@@ -12315,7 +12315,7 @@
         <p:spPr>
           <a:xfrm>
             <a:off x="335520" y="2906640"/>
-            <a:ext cx="10723680" cy="1470600"/>
+            <a:ext cx="10722960" cy="1469880"/>
           </a:xfrm>
           <a:prstGeom prst="rect">
             <a:avLst/>
@@ -12390,7 +12390,7 @@
         <p:spPr>
           <a:xfrm>
             <a:off x="335520" y="764640"/>
-            <a:ext cx="10733040" cy="483840"/>
+            <a:ext cx="10732320" cy="483120"/>
           </a:xfrm>
           <a:prstGeom prst="rect">
             <a:avLst/>
@@ -12444,7 +12444,7 @@
         <p:spPr>
           <a:xfrm>
             <a:off x="335520" y="1244520"/>
-            <a:ext cx="10733040" cy="4332600"/>
+            <a:ext cx="10732320" cy="4331880"/>
           </a:xfrm>
           <a:prstGeom prst="rect">
             <a:avLst/>
@@ -12521,7 +12521,7 @@
         <p:spPr>
           <a:xfrm>
             <a:off x="432720" y="1148040"/>
-            <a:ext cx="10342080" cy="482760"/>
+            <a:ext cx="10341360" cy="482040"/>
           </a:xfrm>
           <a:prstGeom prst="rect">
             <a:avLst/>
@@ -12575,7 +12575,7 @@
         <p:spPr>
           <a:xfrm>
             <a:off x="335520" y="2778480"/>
-            <a:ext cx="10782000" cy="1358640"/>
+            <a:ext cx="10781280" cy="1357920"/>
           </a:xfrm>
           <a:prstGeom prst="roundRect">
             <a:avLst>
@@ -12631,7 +12631,7 @@
         <p:spPr>
           <a:xfrm>
             <a:off x="335520" y="1268280"/>
-            <a:ext cx="10728360" cy="5015880"/>
+            <a:ext cx="10727640" cy="5015160"/>
           </a:xfrm>
           <a:prstGeom prst="rect">
             <a:avLst/>
@@ -12979,7 +12979,7 @@
         <p:spPr>
           <a:xfrm>
             <a:off x="335520" y="764640"/>
-            <a:ext cx="10728360" cy="479160"/>
+            <a:ext cx="10727640" cy="478440"/>
           </a:xfrm>
           <a:prstGeom prst="rect">
             <a:avLst/>
@@ -13033,7 +13033,7 @@
         <p:spPr>
           <a:xfrm>
             <a:off x="335520" y="1268280"/>
-            <a:ext cx="10728360" cy="5015880"/>
+            <a:ext cx="10727640" cy="5015160"/>
           </a:xfrm>
           <a:prstGeom prst="rect">
             <a:avLst/>
@@ -13113,7 +13113,7 @@
         <p:spPr>
           <a:xfrm>
             <a:off x="432720" y="1148040"/>
-            <a:ext cx="10333800" cy="474480"/>
+            <a:ext cx="10333080" cy="473760"/>
           </a:xfrm>
           <a:prstGeom prst="rect">
             <a:avLst/>
@@ -13167,7 +13167,7 @@
         <p:spPr>
           <a:xfrm>
             <a:off x="198000" y="3420000"/>
-            <a:ext cx="10779120" cy="998280"/>
+            <a:ext cx="10778400" cy="997560"/>
           </a:xfrm>
           <a:prstGeom prst="roundRect">
             <a:avLst>
@@ -13253,7 +13253,7 @@
         <p:spPr>
           <a:xfrm>
             <a:off x="335520" y="764640"/>
-            <a:ext cx="10728360" cy="479160"/>
+            <a:ext cx="10727640" cy="478440"/>
           </a:xfrm>
           <a:prstGeom prst="rect">
             <a:avLst/>
@@ -13307,7 +13307,7 @@
         <p:spPr>
           <a:xfrm>
             <a:off x="432720" y="1148040"/>
-            <a:ext cx="10333800" cy="474480"/>
+            <a:ext cx="10333080" cy="473760"/>
           </a:xfrm>
           <a:prstGeom prst="rect">
             <a:avLst/>
@@ -13361,7 +13361,7 @@
         <p:spPr>
           <a:xfrm>
             <a:off x="335520" y="1268280"/>
-            <a:ext cx="10724040" cy="5011560"/>
+            <a:ext cx="10723320" cy="5010840"/>
           </a:xfrm>
           <a:prstGeom prst="rect">
             <a:avLst/>
@@ -13574,7 +13574,7 @@
         <p:spPr>
           <a:xfrm>
             <a:off x="335520" y="764640"/>
-            <a:ext cx="10728360" cy="479160"/>
+            <a:ext cx="10727640" cy="478440"/>
           </a:xfrm>
           <a:prstGeom prst="rect">
             <a:avLst/>
@@ -13628,7 +13628,7 @@
         <p:spPr>
           <a:xfrm>
             <a:off x="432720" y="1148040"/>
-            <a:ext cx="10333800" cy="474480"/>
+            <a:ext cx="10333080" cy="473760"/>
           </a:xfrm>
           <a:prstGeom prst="rect">
             <a:avLst/>
@@ -13682,7 +13682,7 @@
         <p:spPr>
           <a:xfrm>
             <a:off x="335520" y="1268280"/>
-            <a:ext cx="10724040" cy="5011560"/>
+            <a:ext cx="10723320" cy="5010840"/>
           </a:xfrm>
           <a:prstGeom prst="rect">
             <a:avLst/>
@@ -13895,7 +13895,7 @@
         <p:spPr>
           <a:xfrm>
             <a:off x="335520" y="764640"/>
-            <a:ext cx="10730160" cy="480960"/>
+            <a:ext cx="10729440" cy="480240"/>
           </a:xfrm>
           <a:prstGeom prst="rect">
             <a:avLst/>
@@ -13949,7 +13949,7 @@
         <p:spPr>
           <a:xfrm>
             <a:off x="432720" y="1148040"/>
-            <a:ext cx="10339200" cy="479880"/>
+            <a:ext cx="10338480" cy="479160"/>
           </a:xfrm>
           <a:prstGeom prst="rect">
             <a:avLst/>
@@ -14003,7 +14003,7 @@
         <p:spPr>
           <a:xfrm>
             <a:off x="5943600" y="3276720"/>
-            <a:ext cx="4219920" cy="4219920"/>
+            <a:ext cx="4219200" cy="4219200"/>
           </a:xfrm>
           <a:prstGeom prst="rect">
             <a:avLst/>
@@ -14048,7 +14048,7 @@
         <p:spPr>
           <a:xfrm>
             <a:off x="263520" y="6442920"/>
-            <a:ext cx="10784880" cy="501120"/>
+            <a:ext cx="10784160" cy="501120"/>
           </a:xfrm>
           <a:prstGeom prst="rect">
             <a:avLst/>
@@ -14139,7 +14139,7 @@
         <p:spPr>
           <a:xfrm>
             <a:off x="1347120" y="1853640"/>
-            <a:ext cx="8314560" cy="4396680"/>
+            <a:ext cx="8313840" cy="4395960"/>
           </a:xfrm>
           <a:prstGeom prst="rect">
             <a:avLst/>
@@ -14188,7 +14188,7 @@
         <p:spPr>
           <a:xfrm>
             <a:off x="335520" y="764640"/>
-            <a:ext cx="10730160" cy="480960"/>
+            <a:ext cx="10729440" cy="480240"/>
           </a:xfrm>
           <a:prstGeom prst="rect">
             <a:avLst/>
@@ -14242,7 +14242,7 @@
         <p:spPr>
           <a:xfrm>
             <a:off x="432720" y="1148040"/>
-            <a:ext cx="10339200" cy="479880"/>
+            <a:ext cx="10338480" cy="479160"/>
           </a:xfrm>
           <a:prstGeom prst="rect">
             <a:avLst/>
@@ -14296,7 +14296,7 @@
         <p:spPr>
           <a:xfrm>
             <a:off x="335520" y="1268280"/>
-            <a:ext cx="10728360" cy="5015880"/>
+            <a:ext cx="10727640" cy="5015160"/>
           </a:xfrm>
           <a:prstGeom prst="rect">
             <a:avLst/>
@@ -14486,7 +14486,7 @@
         <p:spPr>
           <a:xfrm>
             <a:off x="335520" y="764640"/>
-            <a:ext cx="10730160" cy="480960"/>
+            <a:ext cx="10729440" cy="480240"/>
           </a:xfrm>
           <a:prstGeom prst="rect">
             <a:avLst/>
@@ -14540,7 +14540,7 @@
         <p:spPr>
           <a:xfrm>
             <a:off x="335520" y="1268280"/>
-            <a:ext cx="10730160" cy="5017680"/>
+            <a:ext cx="10729440" cy="5016960"/>
           </a:xfrm>
           <a:prstGeom prst="rect">
             <a:avLst/>
@@ -14620,7 +14620,7 @@
         <p:spPr>
           <a:xfrm>
             <a:off x="432720" y="1148040"/>
-            <a:ext cx="10339200" cy="479880"/>
+            <a:ext cx="10338480" cy="479160"/>
           </a:xfrm>
           <a:prstGeom prst="rect">
             <a:avLst/>
@@ -14674,7 +14674,7 @@
         <p:spPr>
           <a:xfrm>
             <a:off x="335520" y="3291840"/>
-            <a:ext cx="10779120" cy="1355760"/>
+            <a:ext cx="10778400" cy="1355040"/>
           </a:xfrm>
           <a:prstGeom prst="roundRect">
             <a:avLst>
@@ -14730,7 +14730,7 @@
         <p:spPr>
           <a:xfrm>
             <a:off x="263520" y="6492240"/>
-            <a:ext cx="10784880" cy="226800"/>
+            <a:ext cx="10784160" cy="226800"/>
           </a:xfrm>
           <a:prstGeom prst="rect">
             <a:avLst/>
@@ -14784,7 +14784,7 @@
         <p:spPr>
           <a:xfrm>
             <a:off x="263520" y="6309360"/>
-            <a:ext cx="10784880" cy="226800"/>
+            <a:ext cx="10784160" cy="226800"/>
           </a:xfrm>
           <a:prstGeom prst="rect">
             <a:avLst/>
@@ -14880,7 +14880,7 @@
         <p:spPr>
           <a:xfrm>
             <a:off x="335520" y="764640"/>
-            <a:ext cx="10730160" cy="480960"/>
+            <a:ext cx="10729440" cy="480240"/>
           </a:xfrm>
           <a:prstGeom prst="rect">
             <a:avLst/>
@@ -14934,7 +14934,7 @@
         <p:spPr>
           <a:xfrm>
             <a:off x="335520" y="1268280"/>
-            <a:ext cx="10730160" cy="5017680"/>
+            <a:ext cx="10729440" cy="5016960"/>
           </a:xfrm>
           <a:prstGeom prst="rect">
             <a:avLst/>
@@ -15014,7 +15014,7 @@
         <p:spPr>
           <a:xfrm>
             <a:off x="432720" y="1148040"/>
-            <a:ext cx="10339200" cy="479880"/>
+            <a:ext cx="10338480" cy="479160"/>
           </a:xfrm>
           <a:prstGeom prst="rect">
             <a:avLst/>
@@ -15068,7 +15068,7 @@
         <p:spPr>
           <a:xfrm>
             <a:off x="335520" y="3291840"/>
-            <a:ext cx="10779120" cy="1355760"/>
+            <a:ext cx="10778400" cy="1355040"/>
           </a:xfrm>
           <a:prstGeom prst="roundRect">
             <a:avLst>
@@ -15124,7 +15124,7 @@
         <p:spPr>
           <a:xfrm>
             <a:off x="263520" y="6492240"/>
-            <a:ext cx="10784880" cy="226800"/>
+            <a:ext cx="10784160" cy="226800"/>
           </a:xfrm>
           <a:prstGeom prst="rect">
             <a:avLst/>
@@ -15178,7 +15178,7 @@
         <p:spPr>
           <a:xfrm>
             <a:off x="263520" y="6309360"/>
-            <a:ext cx="10784880" cy="226800"/>
+            <a:ext cx="10784160" cy="226800"/>
           </a:xfrm>
           <a:prstGeom prst="rect">
             <a:avLst/>
@@ -15244,7 +15244,7 @@
         <p:spPr>
           <a:xfrm>
             <a:off x="0" y="5140080"/>
-            <a:ext cx="11422440" cy="348120"/>
+            <a:ext cx="11421720" cy="347400"/>
           </a:xfrm>
           <a:prstGeom prst="rect">
             <a:avLst/>
@@ -15338,7 +15338,7 @@
         <p:spPr>
           <a:xfrm>
             <a:off x="335520" y="764640"/>
-            <a:ext cx="10724040" cy="474840"/>
+            <a:ext cx="10723320" cy="474120"/>
           </a:xfrm>
           <a:prstGeom prst="rect">
             <a:avLst/>
@@ -15392,7 +15392,7 @@
         <p:spPr>
           <a:xfrm>
             <a:off x="432720" y="1148040"/>
-            <a:ext cx="10333080" cy="473760"/>
+            <a:ext cx="10332360" cy="473040"/>
           </a:xfrm>
           <a:prstGeom prst="rect">
             <a:avLst/>
@@ -15446,7 +15446,7 @@
         <p:spPr>
           <a:xfrm>
             <a:off x="263520" y="6492240"/>
-            <a:ext cx="10784880" cy="226800"/>
+            <a:ext cx="10784160" cy="226800"/>
           </a:xfrm>
           <a:prstGeom prst="rect">
             <a:avLst/>
@@ -15500,7 +15500,7 @@
         <p:spPr>
           <a:xfrm>
             <a:off x="263520" y="6309360"/>
-            <a:ext cx="10784880" cy="226800"/>
+            <a:ext cx="10784160" cy="226800"/>
           </a:xfrm>
           <a:prstGeom prst="rect">
             <a:avLst/>
@@ -15596,7 +15596,7 @@
         <p:spPr>
           <a:xfrm>
             <a:off x="335520" y="764640"/>
-            <a:ext cx="10724040" cy="474840"/>
+            <a:ext cx="10723320" cy="474120"/>
           </a:xfrm>
           <a:prstGeom prst="rect">
             <a:avLst/>
@@ -15650,7 +15650,7 @@
         <p:spPr>
           <a:xfrm>
             <a:off x="335520" y="1268280"/>
-            <a:ext cx="10724040" cy="5011560"/>
+            <a:ext cx="10723320" cy="5010840"/>
           </a:xfrm>
           <a:prstGeom prst="rect">
             <a:avLst/>
@@ -15901,7 +15901,7 @@
         <p:spPr>
           <a:xfrm>
             <a:off x="432720" y="1148040"/>
-            <a:ext cx="10333080" cy="473760"/>
+            <a:ext cx="10332360" cy="473040"/>
           </a:xfrm>
           <a:prstGeom prst="rect">
             <a:avLst/>
@@ -15955,7 +15955,7 @@
         <p:spPr>
           <a:xfrm>
             <a:off x="263520" y="6492240"/>
-            <a:ext cx="10784880" cy="226800"/>
+            <a:ext cx="10784160" cy="226800"/>
           </a:xfrm>
           <a:prstGeom prst="rect">
             <a:avLst/>
@@ -16009,7 +16009,7 @@
         <p:spPr>
           <a:xfrm>
             <a:off x="263520" y="6309360"/>
-            <a:ext cx="10784880" cy="226800"/>
+            <a:ext cx="10784160" cy="226800"/>
           </a:xfrm>
           <a:prstGeom prst="rect">
             <a:avLst/>
@@ -16105,7 +16105,7 @@
         <p:spPr>
           <a:xfrm>
             <a:off x="335520" y="764640"/>
-            <a:ext cx="10728000" cy="478800"/>
+            <a:ext cx="10727280" cy="478080"/>
           </a:xfrm>
           <a:prstGeom prst="rect">
             <a:avLst/>
@@ -16159,7 +16159,7 @@
         <p:spPr>
           <a:xfrm>
             <a:off x="335520" y="1268280"/>
-            <a:ext cx="10728000" cy="5015520"/>
+            <a:ext cx="10727280" cy="5014800"/>
           </a:xfrm>
           <a:prstGeom prst="rect">
             <a:avLst/>
@@ -16383,7 +16383,7 @@
         <p:spPr>
           <a:xfrm>
             <a:off x="432720" y="1148040"/>
-            <a:ext cx="10333440" cy="474120"/>
+            <a:ext cx="10332720" cy="473400"/>
           </a:xfrm>
           <a:prstGeom prst="rect">
             <a:avLst/>
@@ -16437,7 +16437,7 @@
         <p:spPr>
           <a:xfrm>
             <a:off x="263520" y="6411600"/>
-            <a:ext cx="9786240" cy="382320"/>
+            <a:ext cx="9785520" cy="382320"/>
           </a:xfrm>
           <a:prstGeom prst="rect">
             <a:avLst/>
@@ -16566,7 +16566,7 @@
         <p:spPr>
           <a:xfrm>
             <a:off x="335520" y="764640"/>
-            <a:ext cx="10724040" cy="474840"/>
+            <a:ext cx="10723320" cy="474120"/>
           </a:xfrm>
           <a:prstGeom prst="rect">
             <a:avLst/>
@@ -16620,7 +16620,7 @@
         <p:spPr>
           <a:xfrm>
             <a:off x="335520" y="1268280"/>
-            <a:ext cx="10724040" cy="5011560"/>
+            <a:ext cx="10723320" cy="5010840"/>
           </a:xfrm>
           <a:prstGeom prst="rect">
             <a:avLst/>
@@ -16877,7 +16877,7 @@
         <p:spPr>
           <a:xfrm>
             <a:off x="432720" y="1148040"/>
-            <a:ext cx="10333080" cy="473760"/>
+            <a:ext cx="10332360" cy="473040"/>
           </a:xfrm>
           <a:prstGeom prst="rect">
             <a:avLst/>
@@ -16931,7 +16931,7 @@
         <p:spPr>
           <a:xfrm>
             <a:off x="263520" y="6492240"/>
-            <a:ext cx="10784880" cy="226800"/>
+            <a:ext cx="10784160" cy="226800"/>
           </a:xfrm>
           <a:prstGeom prst="rect">
             <a:avLst/>
@@ -16985,7 +16985,7 @@
         <p:spPr>
           <a:xfrm>
             <a:off x="263520" y="6309360"/>
-            <a:ext cx="10784880" cy="226800"/>
+            <a:ext cx="10784160" cy="226800"/>
           </a:xfrm>
           <a:prstGeom prst="rect">
             <a:avLst/>
@@ -17081,7 +17081,7 @@
         <p:spPr>
           <a:xfrm>
             <a:off x="335520" y="764640"/>
-            <a:ext cx="10724040" cy="474840"/>
+            <a:ext cx="10723320" cy="474120"/>
           </a:xfrm>
           <a:prstGeom prst="rect">
             <a:avLst/>
@@ -17135,7 +17135,7 @@
         <p:spPr>
           <a:xfrm>
             <a:off x="335520" y="1268280"/>
-            <a:ext cx="10724040" cy="5011560"/>
+            <a:ext cx="10723320" cy="5010840"/>
           </a:xfrm>
           <a:prstGeom prst="rect">
             <a:avLst/>
@@ -17398,7 +17398,7 @@
         <p:spPr>
           <a:xfrm>
             <a:off x="432720" y="1148040"/>
-            <a:ext cx="10333080" cy="473760"/>
+            <a:ext cx="10332360" cy="473040"/>
           </a:xfrm>
           <a:prstGeom prst="rect">
             <a:avLst/>
@@ -17452,7 +17452,7 @@
         <p:spPr>
           <a:xfrm>
             <a:off x="263520" y="6492240"/>
-            <a:ext cx="10784880" cy="226800"/>
+            <a:ext cx="10784160" cy="226800"/>
           </a:xfrm>
           <a:prstGeom prst="rect">
             <a:avLst/>
@@ -17506,7 +17506,7 @@
         <p:spPr>
           <a:xfrm>
             <a:off x="263520" y="6309360"/>
-            <a:ext cx="10784880" cy="226800"/>
+            <a:ext cx="10784160" cy="226800"/>
           </a:xfrm>
           <a:prstGeom prst="rect">
             <a:avLst/>
@@ -17602,7 +17602,7 @@
         <p:spPr>
           <a:xfrm>
             <a:off x="335520" y="764640"/>
-            <a:ext cx="10724040" cy="474840"/>
+            <a:ext cx="10723320" cy="474120"/>
           </a:xfrm>
           <a:prstGeom prst="rect">
             <a:avLst/>
@@ -17656,7 +17656,7 @@
         <p:spPr>
           <a:xfrm>
             <a:off x="335520" y="1268280"/>
-            <a:ext cx="10724040" cy="5011560"/>
+            <a:ext cx="10723320" cy="5010840"/>
           </a:xfrm>
           <a:prstGeom prst="rect">
             <a:avLst/>
@@ -17925,7 +17925,7 @@
         <p:spPr>
           <a:xfrm>
             <a:off x="432720" y="1148040"/>
-            <a:ext cx="10333080" cy="473760"/>
+            <a:ext cx="10332360" cy="473040"/>
           </a:xfrm>
           <a:prstGeom prst="rect">
             <a:avLst/>
@@ -17979,7 +17979,7 @@
         <p:spPr>
           <a:xfrm>
             <a:off x="263520" y="6492240"/>
-            <a:ext cx="10784880" cy="226800"/>
+            <a:ext cx="10784160" cy="226800"/>
           </a:xfrm>
           <a:prstGeom prst="rect">
             <a:avLst/>
@@ -18033,7 +18033,7 @@
         <p:spPr>
           <a:xfrm>
             <a:off x="263520" y="6309360"/>
-            <a:ext cx="10784880" cy="226800"/>
+            <a:ext cx="10784160" cy="226800"/>
           </a:xfrm>
           <a:prstGeom prst="rect">
             <a:avLst/>
@@ -18129,7 +18129,7 @@
         <p:spPr>
           <a:xfrm>
             <a:off x="335520" y="764640"/>
-            <a:ext cx="10724040" cy="474840"/>
+            <a:ext cx="10723320" cy="474120"/>
           </a:xfrm>
           <a:prstGeom prst="rect">
             <a:avLst/>
@@ -18183,7 +18183,7 @@
         <p:spPr>
           <a:xfrm>
             <a:off x="335520" y="1268280"/>
-            <a:ext cx="10724040" cy="5011560"/>
+            <a:ext cx="10723320" cy="5010840"/>
           </a:xfrm>
           <a:prstGeom prst="rect">
             <a:avLst/>
@@ -18458,7 +18458,7 @@
         <p:spPr>
           <a:xfrm>
             <a:off x="432720" y="1148040"/>
-            <a:ext cx="10333080" cy="473760"/>
+            <a:ext cx="10332360" cy="473040"/>
           </a:xfrm>
           <a:prstGeom prst="rect">
             <a:avLst/>
@@ -18512,7 +18512,7 @@
         <p:spPr>
           <a:xfrm>
             <a:off x="263520" y="6492240"/>
-            <a:ext cx="10784880" cy="226800"/>
+            <a:ext cx="10784160" cy="226800"/>
           </a:xfrm>
           <a:prstGeom prst="rect">
             <a:avLst/>
@@ -18566,7 +18566,7 @@
         <p:spPr>
           <a:xfrm>
             <a:off x="263520" y="6309360"/>
-            <a:ext cx="10784880" cy="226800"/>
+            <a:ext cx="10784160" cy="226800"/>
           </a:xfrm>
           <a:prstGeom prst="rect">
             <a:avLst/>
@@ -18662,7 +18662,7 @@
         <p:spPr>
           <a:xfrm>
             <a:off x="335520" y="764640"/>
-            <a:ext cx="10724040" cy="474840"/>
+            <a:ext cx="10723320" cy="474120"/>
           </a:xfrm>
           <a:prstGeom prst="rect">
             <a:avLst/>
@@ -18716,7 +18716,7 @@
         <p:spPr>
           <a:xfrm>
             <a:off x="432720" y="1148040"/>
-            <a:ext cx="10333080" cy="473760"/>
+            <a:ext cx="10332360" cy="473040"/>
           </a:xfrm>
           <a:prstGeom prst="rect">
             <a:avLst/>
@@ -18770,7 +18770,7 @@
         <p:spPr>
           <a:xfrm>
             <a:off x="263520" y="6492240"/>
-            <a:ext cx="10784880" cy="226800"/>
+            <a:ext cx="10784160" cy="226800"/>
           </a:xfrm>
           <a:prstGeom prst="rect">
             <a:avLst/>
@@ -18846,7 +18846,7 @@
         <p:spPr>
           <a:xfrm>
             <a:off x="263520" y="6309360"/>
-            <a:ext cx="10784880" cy="226800"/>
+            <a:ext cx="10784160" cy="226800"/>
           </a:xfrm>
           <a:prstGeom prst="rect">
             <a:avLst/>
@@ -18900,7 +18900,7 @@
         <p:spPr>
           <a:xfrm>
             <a:off x="327960" y="3165120"/>
-            <a:ext cx="10779120" cy="1355760"/>
+            <a:ext cx="10778400" cy="1355040"/>
           </a:xfrm>
           <a:prstGeom prst="roundRect">
             <a:avLst>
@@ -18956,7 +18956,7 @@
         <p:spPr>
           <a:xfrm>
             <a:off x="335520" y="1268280"/>
-            <a:ext cx="10730160" cy="5017680"/>
+            <a:ext cx="10729440" cy="5016960"/>
           </a:xfrm>
           <a:prstGeom prst="rect">
             <a:avLst/>
@@ -19063,7 +19063,7 @@
         <p:spPr>
           <a:xfrm>
             <a:off x="335520" y="764640"/>
-            <a:ext cx="10724040" cy="474840"/>
+            <a:ext cx="10723320" cy="474120"/>
           </a:xfrm>
           <a:prstGeom prst="rect">
             <a:avLst/>
@@ -19117,7 +19117,7 @@
         <p:spPr>
           <a:xfrm>
             <a:off x="432720" y="1235520"/>
-            <a:ext cx="10333080" cy="473760"/>
+            <a:ext cx="10332360" cy="473040"/>
           </a:xfrm>
           <a:prstGeom prst="rect">
             <a:avLst/>
@@ -19194,7 +19194,7 @@
         <p:spPr>
           <a:xfrm>
             <a:off x="259200" y="6424200"/>
-            <a:ext cx="11059560" cy="363960"/>
+            <a:ext cx="11058840" cy="363960"/>
           </a:xfrm>
           <a:prstGeom prst="rect">
             <a:avLst/>
@@ -19265,7 +19265,7 @@
         <p:spPr>
           <a:xfrm>
             <a:off x="620280" y="2789280"/>
-            <a:ext cx="10426680" cy="1493640"/>
+            <a:ext cx="10425960" cy="1492920"/>
           </a:xfrm>
           <a:prstGeom prst="rect">
             <a:avLst/>
@@ -19284,7 +19284,7 @@
         <p:spPr>
           <a:xfrm>
             <a:off x="5760720" y="4249800"/>
-            <a:ext cx="247320" cy="700920"/>
+            <a:ext cx="246600" cy="700200"/>
           </a:xfrm>
           <a:prstGeom prst="upArrow">
             <a:avLst>
@@ -19336,7 +19336,7 @@
         <p:spPr>
           <a:xfrm>
             <a:off x="9410040" y="4279680"/>
-            <a:ext cx="247320" cy="700920"/>
+            <a:ext cx="246600" cy="700200"/>
           </a:xfrm>
           <a:prstGeom prst="upArrow">
             <a:avLst>
@@ -19418,7 +19418,7 @@
         <p:spPr>
           <a:xfrm>
             <a:off x="335520" y="764640"/>
-            <a:ext cx="10728360" cy="479160"/>
+            <a:ext cx="10727640" cy="478440"/>
           </a:xfrm>
           <a:prstGeom prst="rect">
             <a:avLst/>
@@ -19472,7 +19472,7 @@
         <p:spPr>
           <a:xfrm>
             <a:off x="335520" y="1268280"/>
-            <a:ext cx="10728360" cy="5015880"/>
+            <a:ext cx="10727640" cy="5015160"/>
           </a:xfrm>
           <a:prstGeom prst="rect">
             <a:avLst/>
@@ -19552,7 +19552,7 @@
         <p:spPr>
           <a:xfrm>
             <a:off x="432720" y="1148040"/>
-            <a:ext cx="10333800" cy="474480"/>
+            <a:ext cx="10333080" cy="473760"/>
           </a:xfrm>
           <a:prstGeom prst="rect">
             <a:avLst/>
@@ -19606,7 +19606,7 @@
         <p:spPr>
           <a:xfrm>
             <a:off x="198000" y="3420000"/>
-            <a:ext cx="10779120" cy="998280"/>
+            <a:ext cx="10778400" cy="997560"/>
           </a:xfrm>
           <a:prstGeom prst="roundRect">
             <a:avLst>
@@ -19692,7 +19692,7 @@
         <p:spPr>
           <a:xfrm>
             <a:off x="335520" y="764640"/>
-            <a:ext cx="10724040" cy="474840"/>
+            <a:ext cx="10723320" cy="474120"/>
           </a:xfrm>
           <a:prstGeom prst="rect">
             <a:avLst/>
@@ -19746,7 +19746,7 @@
         <p:spPr>
           <a:xfrm>
             <a:off x="335520" y="1268280"/>
-            <a:ext cx="7389360" cy="5011560"/>
+            <a:ext cx="7388640" cy="5010840"/>
           </a:xfrm>
           <a:prstGeom prst="rect">
             <a:avLst/>
@@ -19900,7 +19900,7 @@
         <p:spPr>
           <a:xfrm>
             <a:off x="432720" y="1148040"/>
-            <a:ext cx="10333080" cy="473760"/>
+            <a:ext cx="10332360" cy="473040"/>
           </a:xfrm>
           <a:prstGeom prst="rect">
             <a:avLst/>
@@ -19954,7 +19954,7 @@
         <p:spPr>
           <a:xfrm>
             <a:off x="263520" y="6492240"/>
-            <a:ext cx="10784880" cy="226800"/>
+            <a:ext cx="10784160" cy="226800"/>
           </a:xfrm>
           <a:prstGeom prst="rect">
             <a:avLst/>
@@ -20008,7 +20008,7 @@
         <p:spPr>
           <a:xfrm>
             <a:off x="263520" y="6309360"/>
-            <a:ext cx="10784880" cy="226800"/>
+            <a:ext cx="10784160" cy="226800"/>
           </a:xfrm>
           <a:prstGeom prst="rect">
             <a:avLst/>
@@ -20074,7 +20074,7 @@
         <p:spPr>
           <a:xfrm>
             <a:off x="8076600" y="1268280"/>
-            <a:ext cx="3178440" cy="4955400"/>
+            <a:ext cx="3177720" cy="4954680"/>
           </a:xfrm>
           <a:prstGeom prst="rect">
             <a:avLst/>
@@ -20204,7 +20204,7 @@
         <p:spPr>
           <a:xfrm>
             <a:off x="335520" y="764640"/>
-            <a:ext cx="10724040" cy="474840"/>
+            <a:ext cx="10723320" cy="474120"/>
           </a:xfrm>
           <a:prstGeom prst="rect">
             <a:avLst/>
@@ -20258,7 +20258,7 @@
         <p:spPr>
           <a:xfrm>
             <a:off x="335520" y="1268280"/>
-            <a:ext cx="7389360" cy="5011560"/>
+            <a:ext cx="7388640" cy="5010840"/>
           </a:xfrm>
           <a:prstGeom prst="rect">
             <a:avLst/>
@@ -20486,7 +20486,7 @@
         <p:spPr>
           <a:xfrm>
             <a:off x="432720" y="1148040"/>
-            <a:ext cx="10333080" cy="473760"/>
+            <a:ext cx="10332360" cy="473040"/>
           </a:xfrm>
           <a:prstGeom prst="rect">
             <a:avLst/>
@@ -20540,7 +20540,7 @@
         <p:spPr>
           <a:xfrm>
             <a:off x="263520" y="6492240"/>
-            <a:ext cx="10784880" cy="226800"/>
+            <a:ext cx="10784160" cy="226800"/>
           </a:xfrm>
           <a:prstGeom prst="rect">
             <a:avLst/>
@@ -20594,7 +20594,7 @@
         <p:spPr>
           <a:xfrm>
             <a:off x="263520" y="6309360"/>
-            <a:ext cx="10784880" cy="226800"/>
+            <a:ext cx="10784160" cy="226800"/>
           </a:xfrm>
           <a:prstGeom prst="rect">
             <a:avLst/>
@@ -20660,7 +20660,7 @@
         <p:spPr>
           <a:xfrm>
             <a:off x="8076600" y="1268280"/>
-            <a:ext cx="3178440" cy="4955400"/>
+            <a:ext cx="3177720" cy="4954680"/>
           </a:xfrm>
           <a:prstGeom prst="rect">
             <a:avLst/>
@@ -20790,7 +20790,7 @@
         <p:spPr>
           <a:xfrm>
             <a:off x="335520" y="764640"/>
-            <a:ext cx="10724040" cy="474840"/>
+            <a:ext cx="10723320" cy="474120"/>
           </a:xfrm>
           <a:prstGeom prst="rect">
             <a:avLst/>
@@ -20844,7 +20844,7 @@
         <p:spPr>
           <a:xfrm>
             <a:off x="335520" y="1268280"/>
-            <a:ext cx="7389360" cy="5011560"/>
+            <a:ext cx="7388640" cy="5010840"/>
           </a:xfrm>
           <a:prstGeom prst="rect">
             <a:avLst/>
@@ -21072,7 +21072,7 @@
         <p:spPr>
           <a:xfrm>
             <a:off x="432720" y="1148040"/>
-            <a:ext cx="10333080" cy="473760"/>
+            <a:ext cx="10332360" cy="473040"/>
           </a:xfrm>
           <a:prstGeom prst="rect">
             <a:avLst/>
@@ -21126,7 +21126,7 @@
         <p:spPr>
           <a:xfrm>
             <a:off x="263520" y="6492240"/>
-            <a:ext cx="10784880" cy="226800"/>
+            <a:ext cx="10784160" cy="226800"/>
           </a:xfrm>
           <a:prstGeom prst="rect">
             <a:avLst/>
@@ -21180,7 +21180,7 @@
         <p:spPr>
           <a:xfrm>
             <a:off x="263520" y="6309360"/>
-            <a:ext cx="10784880" cy="226800"/>
+            <a:ext cx="10784160" cy="226800"/>
           </a:xfrm>
           <a:prstGeom prst="rect">
             <a:avLst/>
@@ -21246,7 +21246,7 @@
         <p:spPr>
           <a:xfrm>
             <a:off x="8076600" y="1268280"/>
-            <a:ext cx="3178440" cy="4955400"/>
+            <a:ext cx="3177720" cy="4954680"/>
           </a:xfrm>
           <a:prstGeom prst="rect">
             <a:avLst/>
@@ -21376,7 +21376,7 @@
         <p:spPr>
           <a:xfrm>
             <a:off x="335520" y="764640"/>
-            <a:ext cx="10728000" cy="478800"/>
+            <a:ext cx="10727280" cy="478080"/>
           </a:xfrm>
           <a:prstGeom prst="rect">
             <a:avLst/>
@@ -21430,7 +21430,7 @@
         <p:spPr>
           <a:xfrm>
             <a:off x="335520" y="1268280"/>
-            <a:ext cx="10728000" cy="5015520"/>
+            <a:ext cx="10727280" cy="5014800"/>
           </a:xfrm>
           <a:prstGeom prst="rect">
             <a:avLst/>
@@ -21742,7 +21742,7 @@
         <p:spPr>
           <a:xfrm>
             <a:off x="432720" y="1148040"/>
-            <a:ext cx="10333440" cy="474120"/>
+            <a:ext cx="10332720" cy="473400"/>
           </a:xfrm>
           <a:prstGeom prst="rect">
             <a:avLst/>
@@ -21796,7 +21796,7 @@
         <p:spPr>
           <a:xfrm>
             <a:off x="263520" y="6411600"/>
-            <a:ext cx="9786240" cy="382320"/>
+            <a:ext cx="9785520" cy="382320"/>
           </a:xfrm>
           <a:prstGeom prst="rect">
             <a:avLst/>
@@ -21925,7 +21925,7 @@
         <p:spPr>
           <a:xfrm>
             <a:off x="335520" y="764640"/>
-            <a:ext cx="10724040" cy="474840"/>
+            <a:ext cx="10723320" cy="474120"/>
           </a:xfrm>
           <a:prstGeom prst="rect">
             <a:avLst/>
@@ -21979,7 +21979,7 @@
         <p:spPr>
           <a:xfrm>
             <a:off x="335520" y="1268280"/>
-            <a:ext cx="7389360" cy="5011560"/>
+            <a:ext cx="7388640" cy="5010840"/>
           </a:xfrm>
           <a:prstGeom prst="rect">
             <a:avLst/>
@@ -22219,7 +22219,7 @@
         <p:spPr>
           <a:xfrm>
             <a:off x="432720" y="1148040"/>
-            <a:ext cx="10333080" cy="473760"/>
+            <a:ext cx="10332360" cy="473040"/>
           </a:xfrm>
           <a:prstGeom prst="rect">
             <a:avLst/>
@@ -22273,7 +22273,7 @@
         <p:spPr>
           <a:xfrm>
             <a:off x="263520" y="6492240"/>
-            <a:ext cx="10784880" cy="226800"/>
+            <a:ext cx="10784160" cy="226800"/>
           </a:xfrm>
           <a:prstGeom prst="rect">
             <a:avLst/>
@@ -22327,7 +22327,7 @@
         <p:spPr>
           <a:xfrm>
             <a:off x="263520" y="6309360"/>
-            <a:ext cx="10784880" cy="226800"/>
+            <a:ext cx="10784160" cy="226800"/>
           </a:xfrm>
           <a:prstGeom prst="rect">
             <a:avLst/>
@@ -22393,7 +22393,7 @@
         <p:spPr>
           <a:xfrm>
             <a:off x="8076600" y="1268280"/>
-            <a:ext cx="3178440" cy="4955400"/>
+            <a:ext cx="3177720" cy="4954680"/>
           </a:xfrm>
           <a:prstGeom prst="rect">
             <a:avLst/>
@@ -22523,7 +22523,7 @@
         <p:spPr>
           <a:xfrm>
             <a:off x="335520" y="764640"/>
-            <a:ext cx="10724040" cy="474840"/>
+            <a:ext cx="10723320" cy="474120"/>
           </a:xfrm>
           <a:prstGeom prst="rect">
             <a:avLst/>
@@ -22577,7 +22577,7 @@
         <p:spPr>
           <a:xfrm>
             <a:off x="335520" y="1268280"/>
-            <a:ext cx="7389360" cy="5011560"/>
+            <a:ext cx="7388640" cy="5010840"/>
           </a:xfrm>
           <a:prstGeom prst="rect">
             <a:avLst/>
@@ -22829,7 +22829,7 @@
         <p:spPr>
           <a:xfrm>
             <a:off x="432720" y="1148040"/>
-            <a:ext cx="10333080" cy="473760"/>
+            <a:ext cx="10332360" cy="473040"/>
           </a:xfrm>
           <a:prstGeom prst="rect">
             <a:avLst/>
@@ -22883,7 +22883,7 @@
         <p:spPr>
           <a:xfrm>
             <a:off x="263520" y="6492240"/>
-            <a:ext cx="10784880" cy="226800"/>
+            <a:ext cx="10784160" cy="226800"/>
           </a:xfrm>
           <a:prstGeom prst="rect">
             <a:avLst/>
@@ -22937,7 +22937,7 @@
         <p:spPr>
           <a:xfrm>
             <a:off x="263520" y="6309360"/>
-            <a:ext cx="10784880" cy="226800"/>
+            <a:ext cx="10784160" cy="226800"/>
           </a:xfrm>
           <a:prstGeom prst="rect">
             <a:avLst/>
@@ -23003,7 +23003,7 @@
         <p:spPr>
           <a:xfrm>
             <a:off x="8076600" y="1268280"/>
-            <a:ext cx="3178440" cy="4955400"/>
+            <a:ext cx="3177720" cy="4954680"/>
           </a:xfrm>
           <a:prstGeom prst="rect">
             <a:avLst/>
@@ -23133,7 +23133,7 @@
         <p:spPr>
           <a:xfrm>
             <a:off x="335520" y="764640"/>
-            <a:ext cx="10724040" cy="474840"/>
+            <a:ext cx="10723320" cy="474120"/>
           </a:xfrm>
           <a:prstGeom prst="rect">
             <a:avLst/>
@@ -23187,7 +23187,7 @@
         <p:spPr>
           <a:xfrm>
             <a:off x="335520" y="1268280"/>
-            <a:ext cx="10724040" cy="5011560"/>
+            <a:ext cx="10723320" cy="5010840"/>
           </a:xfrm>
           <a:prstGeom prst="rect">
             <a:avLst/>
@@ -23232,7 +23232,7 @@
         <p:spPr>
           <a:xfrm>
             <a:off x="432720" y="1148040"/>
-            <a:ext cx="10333080" cy="473760"/>
+            <a:ext cx="10332360" cy="473040"/>
           </a:xfrm>
           <a:prstGeom prst="rect">
             <a:avLst/>
@@ -23286,7 +23286,7 @@
         <p:spPr>
           <a:xfrm>
             <a:off x="263520" y="6492240"/>
-            <a:ext cx="10784880" cy="226800"/>
+            <a:ext cx="10784160" cy="226800"/>
           </a:xfrm>
           <a:prstGeom prst="rect">
             <a:avLst/>
@@ -23340,7 +23340,7 @@
         <p:spPr>
           <a:xfrm>
             <a:off x="263520" y="6309360"/>
-            <a:ext cx="10784880" cy="226800"/>
+            <a:ext cx="10784160" cy="226800"/>
           </a:xfrm>
           <a:prstGeom prst="rect">
             <a:avLst/>
@@ -23436,7 +23436,7 @@
         <p:spPr>
           <a:xfrm>
             <a:off x="335520" y="764640"/>
-            <a:ext cx="10724040" cy="474840"/>
+            <a:ext cx="10723320" cy="474120"/>
           </a:xfrm>
           <a:prstGeom prst="rect">
             <a:avLst/>
@@ -23490,7 +23490,7 @@
         <p:spPr>
           <a:xfrm>
             <a:off x="335520" y="1268280"/>
-            <a:ext cx="10724040" cy="5011560"/>
+            <a:ext cx="10723320" cy="5010840"/>
           </a:xfrm>
           <a:prstGeom prst="rect">
             <a:avLst/>
@@ -23582,7 +23582,7 @@
         <p:spPr>
           <a:xfrm>
             <a:off x="432720" y="1148040"/>
-            <a:ext cx="10333080" cy="473760"/>
+            <a:ext cx="10332360" cy="473040"/>
           </a:xfrm>
           <a:prstGeom prst="rect">
             <a:avLst/>
@@ -23636,7 +23636,7 @@
         <p:spPr>
           <a:xfrm>
             <a:off x="263520" y="6492240"/>
-            <a:ext cx="10784880" cy="226800"/>
+            <a:ext cx="10784160" cy="226800"/>
           </a:xfrm>
           <a:prstGeom prst="rect">
             <a:avLst/>
@@ -23690,7 +23690,7 @@
         <p:spPr>
           <a:xfrm>
             <a:off x="263520" y="6309360"/>
-            <a:ext cx="10784880" cy="226800"/>
+            <a:ext cx="10784160" cy="226800"/>
           </a:xfrm>
           <a:prstGeom prst="rect">
             <a:avLst/>
@@ -23786,7 +23786,7 @@
         <p:spPr>
           <a:xfrm>
             <a:off x="335520" y="764640"/>
-            <a:ext cx="10729080" cy="479880"/>
+            <a:ext cx="10728360" cy="479160"/>
           </a:xfrm>
           <a:prstGeom prst="rect">
             <a:avLst/>
@@ -23840,7 +23840,7 @@
         <p:spPr>
           <a:xfrm>
             <a:off x="335520" y="1268640"/>
-            <a:ext cx="10729080" cy="5016600"/>
+            <a:ext cx="10728360" cy="5015880"/>
           </a:xfrm>
           <a:prstGeom prst="rect">
             <a:avLst/>
@@ -24123,7 +24123,7 @@
         <p:spPr>
           <a:xfrm>
             <a:off x="335520" y="1268640"/>
-            <a:ext cx="10725480" cy="5013000"/>
+            <a:ext cx="10724760" cy="5012280"/>
           </a:xfrm>
           <a:prstGeom prst="rect">
             <a:avLst/>
@@ -24183,7 +24183,7 @@
         <p:spPr>
           <a:xfrm>
             <a:off x="335520" y="764640"/>
-            <a:ext cx="10725480" cy="476280"/>
+            <a:ext cx="10724760" cy="475560"/>
           </a:xfrm>
           <a:prstGeom prst="rect">
             <a:avLst/>
@@ -24258,7 +24258,7 @@
         <p:spPr>
           <a:xfrm>
             <a:off x="335520" y="764640"/>
-            <a:ext cx="10728000" cy="478800"/>
+            <a:ext cx="10727280" cy="478080"/>
           </a:xfrm>
           <a:prstGeom prst="rect">
             <a:avLst/>
@@ -24312,7 +24312,7 @@
         <p:spPr>
           <a:xfrm>
             <a:off x="335520" y="1268280"/>
-            <a:ext cx="10728000" cy="5015520"/>
+            <a:ext cx="10727280" cy="5014800"/>
           </a:xfrm>
           <a:prstGeom prst="rect">
             <a:avLst/>
@@ -24624,7 +24624,7 @@
         <p:spPr>
           <a:xfrm>
             <a:off x="432720" y="1148040"/>
-            <a:ext cx="10333440" cy="474120"/>
+            <a:ext cx="10332720" cy="473400"/>
           </a:xfrm>
           <a:prstGeom prst="rect">
             <a:avLst/>
@@ -24678,7 +24678,7 @@
         <p:spPr>
           <a:xfrm>
             <a:off x="263520" y="6411600"/>
-            <a:ext cx="9786240" cy="382320"/>
+            <a:ext cx="9785520" cy="382320"/>
           </a:xfrm>
           <a:prstGeom prst="rect">
             <a:avLst/>
@@ -24807,7 +24807,7 @@
         <p:spPr>
           <a:xfrm>
             <a:off x="335520" y="764640"/>
-            <a:ext cx="10728000" cy="478800"/>
+            <a:ext cx="10727280" cy="478080"/>
           </a:xfrm>
           <a:prstGeom prst="rect">
             <a:avLst/>
@@ -24861,7 +24861,7 @@
         <p:spPr>
           <a:xfrm>
             <a:off x="335520" y="1268280"/>
-            <a:ext cx="10728000" cy="5015520"/>
+            <a:ext cx="10727280" cy="5014800"/>
           </a:xfrm>
           <a:prstGeom prst="rect">
             <a:avLst/>
@@ -25197,7 +25197,7 @@
         <p:spPr>
           <a:xfrm>
             <a:off x="432720" y="1148040"/>
-            <a:ext cx="10333440" cy="474120"/>
+            <a:ext cx="10332720" cy="473400"/>
           </a:xfrm>
           <a:prstGeom prst="rect">
             <a:avLst/>
@@ -25251,7 +25251,7 @@
         <p:spPr>
           <a:xfrm>
             <a:off x="263520" y="6411600"/>
-            <a:ext cx="9786240" cy="382320"/>
+            <a:ext cx="9785520" cy="382320"/>
           </a:xfrm>
           <a:prstGeom prst="rect">
             <a:avLst/>
@@ -25380,7 +25380,7 @@
         <p:spPr>
           <a:xfrm>
             <a:off x="335520" y="4406760"/>
-            <a:ext cx="10723680" cy="1332720"/>
+            <a:ext cx="10722960" cy="1332000"/>
           </a:xfrm>
           <a:prstGeom prst="rect">
             <a:avLst/>
@@ -25447,7 +25447,7 @@
         <p:spPr>
           <a:xfrm>
             <a:off x="335520" y="2906640"/>
-            <a:ext cx="10723680" cy="1470600"/>
+            <a:ext cx="10722960" cy="1469880"/>
           </a:xfrm>
           <a:prstGeom prst="rect">
             <a:avLst/>
@@ -25522,7 +25522,7 @@
         <p:spPr>
           <a:xfrm>
             <a:off x="335520" y="764640"/>
-            <a:ext cx="10728360" cy="479160"/>
+            <a:ext cx="10727640" cy="478440"/>
           </a:xfrm>
           <a:prstGeom prst="rect">
             <a:avLst/>
@@ -25576,7 +25576,7 @@
         <p:spPr>
           <a:xfrm>
             <a:off x="335520" y="1268280"/>
-            <a:ext cx="10728360" cy="5015880"/>
+            <a:ext cx="10727640" cy="5015160"/>
           </a:xfrm>
           <a:prstGeom prst="rect">
             <a:avLst/>
@@ -25621,7 +25621,7 @@
         <p:spPr>
           <a:xfrm>
             <a:off x="432720" y="1148040"/>
-            <a:ext cx="10333800" cy="474480"/>
+            <a:ext cx="10333080" cy="473760"/>
           </a:xfrm>
           <a:prstGeom prst="rect">
             <a:avLst/>
@@ -25675,7 +25675,7 @@
         <p:spPr>
           <a:xfrm>
             <a:off x="263520" y="6411600"/>
-            <a:ext cx="11073600" cy="226800"/>
+            <a:ext cx="11072880" cy="226800"/>
           </a:xfrm>
           <a:prstGeom prst="rect">
             <a:avLst/>
@@ -25729,7 +25729,7 @@
         <p:spPr>
           <a:xfrm>
             <a:off x="282240" y="2340000"/>
-            <a:ext cx="10781640" cy="1178280"/>
+            <a:ext cx="10780920" cy="1177560"/>
           </a:xfrm>
           <a:prstGeom prst="roundRect">
             <a:avLst>
@@ -25785,7 +25785,7 @@
         <p:spPr>
           <a:xfrm>
             <a:off x="539280" y="2215080"/>
-            <a:ext cx="10333440" cy="875160"/>
+            <a:ext cx="10332720" cy="874440"/>
           </a:xfrm>
           <a:prstGeom prst="rect">
             <a:avLst/>

</xml_diff>